<commit_message>
Icons have been updated.
</commit_message>
<xml_diff>
--- a/images/icons.pptx
+++ b/images/icons.pptx
@@ -288,7 +288,7 @@
           <a:p>
             <a:fld id="{CD851AF9-628A-D441-9A3F-0E66B844A3C7}" type="datetimeFigureOut">
               <a:rPr lang="en-US" smtClean="0"/>
-              <a:t>10/8/14</a:t>
+              <a:t>10/29/14</a:t>
             </a:fld>
             <a:endParaRPr lang="en-US"/>
           </a:p>
@@ -458,7 +458,7 @@
           <a:p>
             <a:fld id="{CD851AF9-628A-D441-9A3F-0E66B844A3C7}" type="datetimeFigureOut">
               <a:rPr lang="en-US" smtClean="0"/>
-              <a:t>10/8/14</a:t>
+              <a:t>10/29/14</a:t>
             </a:fld>
             <a:endParaRPr lang="en-US"/>
           </a:p>
@@ -638,7 +638,7 @@
           <a:p>
             <a:fld id="{CD851AF9-628A-D441-9A3F-0E66B844A3C7}" type="datetimeFigureOut">
               <a:rPr lang="en-US" smtClean="0"/>
-              <a:t>10/8/14</a:t>
+              <a:t>10/29/14</a:t>
             </a:fld>
             <a:endParaRPr lang="en-US"/>
           </a:p>
@@ -808,7 +808,7 @@
           <a:p>
             <a:fld id="{CD851AF9-628A-D441-9A3F-0E66B844A3C7}" type="datetimeFigureOut">
               <a:rPr lang="en-US" smtClean="0"/>
-              <a:t>10/8/14</a:t>
+              <a:t>10/29/14</a:t>
             </a:fld>
             <a:endParaRPr lang="en-US"/>
           </a:p>
@@ -1054,7 +1054,7 @@
           <a:p>
             <a:fld id="{CD851AF9-628A-D441-9A3F-0E66B844A3C7}" type="datetimeFigureOut">
               <a:rPr lang="en-US" smtClean="0"/>
-              <a:t>10/8/14</a:t>
+              <a:t>10/29/14</a:t>
             </a:fld>
             <a:endParaRPr lang="en-US"/>
           </a:p>
@@ -1342,7 +1342,7 @@
           <a:p>
             <a:fld id="{CD851AF9-628A-D441-9A3F-0E66B844A3C7}" type="datetimeFigureOut">
               <a:rPr lang="en-US" smtClean="0"/>
-              <a:t>10/8/14</a:t>
+              <a:t>10/29/14</a:t>
             </a:fld>
             <a:endParaRPr lang="en-US"/>
           </a:p>
@@ -1764,7 +1764,7 @@
           <a:p>
             <a:fld id="{CD851AF9-628A-D441-9A3F-0E66B844A3C7}" type="datetimeFigureOut">
               <a:rPr lang="en-US" smtClean="0"/>
-              <a:t>10/8/14</a:t>
+              <a:t>10/29/14</a:t>
             </a:fld>
             <a:endParaRPr lang="en-US"/>
           </a:p>
@@ -1882,7 +1882,7 @@
           <a:p>
             <a:fld id="{CD851AF9-628A-D441-9A3F-0E66B844A3C7}" type="datetimeFigureOut">
               <a:rPr lang="en-US" smtClean="0"/>
-              <a:t>10/8/14</a:t>
+              <a:t>10/29/14</a:t>
             </a:fld>
             <a:endParaRPr lang="en-US"/>
           </a:p>
@@ -1977,7 +1977,7 @@
           <a:p>
             <a:fld id="{CD851AF9-628A-D441-9A3F-0E66B844A3C7}" type="datetimeFigureOut">
               <a:rPr lang="en-US" smtClean="0"/>
-              <a:t>10/8/14</a:t>
+              <a:t>10/29/14</a:t>
             </a:fld>
             <a:endParaRPr lang="en-US"/>
           </a:p>
@@ -2254,7 +2254,7 @@
           <a:p>
             <a:fld id="{CD851AF9-628A-D441-9A3F-0E66B844A3C7}" type="datetimeFigureOut">
               <a:rPr lang="en-US" smtClean="0"/>
-              <a:t>10/8/14</a:t>
+              <a:t>10/29/14</a:t>
             </a:fld>
             <a:endParaRPr lang="en-US"/>
           </a:p>
@@ -2507,7 +2507,7 @@
           <a:p>
             <a:fld id="{CD851AF9-628A-D441-9A3F-0E66B844A3C7}" type="datetimeFigureOut">
               <a:rPr lang="en-US" smtClean="0"/>
-              <a:t>10/8/14</a:t>
+              <a:t>10/29/14</a:t>
             </a:fld>
             <a:endParaRPr lang="en-US"/>
           </a:p>
@@ -2720,7 +2720,7 @@
           <a:p>
             <a:fld id="{CD851AF9-628A-D441-9A3F-0E66B844A3C7}" type="datetimeFigureOut">
               <a:rPr lang="en-US" smtClean="0"/>
-              <a:t>10/8/14</a:t>
+              <a:t>10/29/14</a:t>
             </a:fld>
             <a:endParaRPr lang="en-US"/>
           </a:p>
@@ -3107,12 +3107,13 @@
         </p:nvSpPr>
         <p:spPr>
           <a:xfrm>
-            <a:off x="1190893" y="2313865"/>
-            <a:ext cx="909786" cy="914400"/>
+            <a:off x="108549" y="1438360"/>
+            <a:ext cx="2901916" cy="914400"/>
           </a:xfrm>
         </p:spPr>
         <p:txBody>
           <a:bodyPr>
+            <a:normAutofit/>
             <a:scene3d>
               <a:camera prst="orthographicFront"/>
               <a:lightRig rig="soft" dir="tl">
@@ -3131,7 +3132,7 @@
           <a:lstStyle/>
           <a:p>
             <a:r>
-              <a:rPr lang="en-US" b="1" i="1" spc="50" dirty="0">
+              <a:rPr lang="en-US" sz="4000" b="1" i="1" spc="50" dirty="0" smtClean="0">
                 <a:ln w="11430"/>
                 <a:gradFill>
                   <a:gsLst>
@@ -3161,7 +3162,38 @@
               </a:rPr>
               <a:t>M</a:t>
             </a:r>
-            <a:endParaRPr lang="en-US" b="1" i="1" spc="50" dirty="0">
+            <a:r>
+              <a:rPr lang="en-US" sz="2400" b="1" i="1" spc="50" dirty="0" smtClean="0">
+                <a:ln w="11430"/>
+                <a:gradFill>
+                  <a:gsLst>
+                    <a:gs pos="25000">
+                      <a:schemeClr val="accent2">
+                        <a:satMod val="155000"/>
+                      </a:schemeClr>
+                    </a:gs>
+                    <a:gs pos="100000">
+                      <a:schemeClr val="accent2">
+                        <a:shade val="45000"/>
+                        <a:satMod val="165000"/>
+                      </a:schemeClr>
+                    </a:gs>
+                  </a:gsLst>
+                  <a:lin ang="5400000"/>
+                </a:gradFill>
+                <a:effectLst>
+                  <a:outerShdw blurRad="76200" dist="50800" dir="5400000" algn="tl" rotWithShape="0">
+                    <a:srgbClr val="000000">
+                      <a:alpha val="65000"/>
+                    </a:srgbClr>
+                  </a:outerShdw>
+                </a:effectLst>
+                <a:latin typeface="Bookman Old Style"/>
+                <a:cs typeface="Bookman Old Style"/>
+              </a:rPr>
+              <a:t>inimize</a:t>
+            </a:r>
+            <a:endParaRPr lang="en-US" sz="2400" b="1" i="1" spc="50" dirty="0">
               <a:ln w="11430"/>
               <a:gradFill>
                 <a:gsLst>
@@ -3202,8 +3234,8 @@
         </p:nvSpPr>
         <p:spPr>
           <a:xfrm>
-            <a:off x="0" y="2282825"/>
-            <a:ext cx="909786" cy="914400"/>
+            <a:off x="633905" y="818679"/>
+            <a:ext cx="1992130" cy="914400"/>
           </a:xfrm>
           <a:prstGeom prst="rect">
             <a:avLst/>
@@ -3245,7 +3277,7 @@
           </a:lstStyle>
           <a:p>
             <a:r>
-              <a:rPr lang="en-US" b="1" i="1" spc="50" dirty="0" smtClean="0">
+              <a:rPr lang="en-US" sz="4000" b="1" i="1" spc="50" dirty="0" smtClean="0">
                 <a:ln w="11430"/>
                 <a:gradFill>
                   <a:gsLst>
@@ -3275,7 +3307,38 @@
               </a:rPr>
               <a:t>S</a:t>
             </a:r>
-            <a:endParaRPr lang="en-US" b="1" i="1" spc="50" dirty="0">
+            <a:r>
+              <a:rPr lang="en-US" sz="2400" b="1" i="1" spc="50" dirty="0" smtClean="0">
+                <a:ln w="11430"/>
+                <a:gradFill>
+                  <a:gsLst>
+                    <a:gs pos="25000">
+                      <a:schemeClr val="accent2">
+                        <a:satMod val="155000"/>
+                      </a:schemeClr>
+                    </a:gs>
+                    <a:gs pos="100000">
+                      <a:schemeClr val="accent2">
+                        <a:shade val="45000"/>
+                        <a:satMod val="165000"/>
+                      </a:schemeClr>
+                    </a:gs>
+                  </a:gsLst>
+                  <a:lin ang="5400000"/>
+                </a:gradFill>
+                <a:effectLst>
+                  <a:outerShdw blurRad="76200" dist="50800" dir="5400000" algn="tl" rotWithShape="0">
+                    <a:srgbClr val="000000">
+                      <a:alpha val="65000"/>
+                    </a:srgbClr>
+                  </a:outerShdw>
+                </a:effectLst>
+                <a:latin typeface="Bookman Old Style"/>
+                <a:cs typeface="Bookman Old Style"/>
+              </a:rPr>
+              <a:t>olvate</a:t>
+            </a:r>
+            <a:endParaRPr lang="en-US" sz="2400" b="1" i="1" spc="50" dirty="0">
               <a:ln w="11430"/>
               <a:gradFill>
                 <a:gsLst>
@@ -3316,8 +3379,8 @@
         </p:nvSpPr>
         <p:spPr>
           <a:xfrm>
-            <a:off x="2100679" y="2318882"/>
-            <a:ext cx="909786" cy="914400"/>
+            <a:off x="633904" y="2309469"/>
+            <a:ext cx="2261109" cy="914400"/>
           </a:xfrm>
           <a:prstGeom prst="rect">
             <a:avLst/>
@@ -3359,7 +3422,7 @@
           </a:lstStyle>
           <a:p>
             <a:r>
-              <a:rPr lang="en-US" b="1" i="1" spc="50" dirty="0">
+              <a:rPr lang="en-US" sz="4000" b="1" i="1" spc="50" dirty="0" smtClean="0">
                 <a:ln w="11430"/>
                 <a:gradFill>
                   <a:gsLst>
@@ -3389,6 +3452,65 @@
               </a:rPr>
               <a:t>I</a:t>
             </a:r>
+            <a:r>
+              <a:rPr lang="en-US" sz="2400" b="1" i="1" spc="50" dirty="0" smtClean="0">
+                <a:ln w="11430"/>
+                <a:gradFill>
+                  <a:gsLst>
+                    <a:gs pos="25000">
+                      <a:schemeClr val="accent2">
+                        <a:satMod val="155000"/>
+                      </a:schemeClr>
+                    </a:gs>
+                    <a:gs pos="100000">
+                      <a:schemeClr val="accent2">
+                        <a:shade val="45000"/>
+                        <a:satMod val="165000"/>
+                      </a:schemeClr>
+                    </a:gs>
+                  </a:gsLst>
+                  <a:lin ang="5400000"/>
+                </a:gradFill>
+                <a:effectLst>
+                  <a:outerShdw blurRad="76200" dist="50800" dir="5400000" algn="tl" rotWithShape="0">
+                    <a:srgbClr val="000000">
+                      <a:alpha val="65000"/>
+                    </a:srgbClr>
+                  </a:outerShdw>
+                </a:effectLst>
+                <a:latin typeface="Bookman Old Style"/>
+                <a:cs typeface="Bookman Old Style"/>
+              </a:rPr>
+              <a:t>onize</a:t>
+            </a:r>
+            <a:endParaRPr lang="en-US" sz="2400" b="1" i="1" spc="50" dirty="0">
+              <a:ln w="11430"/>
+              <a:gradFill>
+                <a:gsLst>
+                  <a:gs pos="25000">
+                    <a:schemeClr val="accent2">
+                      <a:satMod val="155000"/>
+                    </a:schemeClr>
+                  </a:gs>
+                  <a:gs pos="100000">
+                    <a:schemeClr val="accent2">
+                      <a:shade val="45000"/>
+                      <a:satMod val="165000"/>
+                    </a:schemeClr>
+                  </a:gs>
+                </a:gsLst>
+                <a:lin ang="5400000"/>
+              </a:gradFill>
+              <a:effectLst>
+                <a:outerShdw blurRad="76200" dist="50800" dir="5400000" algn="tl" rotWithShape="0">
+                  <a:srgbClr val="000000">
+                    <a:alpha val="65000"/>
+                  </a:srgbClr>
+                </a:outerShdw>
+              </a:effectLst>
+              <a:latin typeface="Bookman Old Style"/>
+              <a:cs typeface="Bookman Old Style"/>
+            </a:endParaRPr>
           </a:p>
         </p:txBody>
       </p:sp>
@@ -3516,8 +3638,8 @@
         </p:nvSpPr>
         <p:spPr>
           <a:xfrm>
-            <a:off x="4117107" y="2313865"/>
-            <a:ext cx="909786" cy="914400"/>
+            <a:off x="467012" y="3282211"/>
+            <a:ext cx="3559306" cy="914400"/>
           </a:xfrm>
           <a:prstGeom prst="rect">
             <a:avLst/>
@@ -3526,6 +3648,182 @@
         <p:txBody>
           <a:bodyPr vert="horz" lIns="91440" tIns="45720" rIns="91440" bIns="45720" rtlCol="0" anchor="ctr">
             <a:normAutofit/>
+            <a:scene3d>
+              <a:camera prst="orthographicFront"/>
+              <a:lightRig rig="soft" dir="tl">
+                <a:rot lat="0" lon="0" rev="0"/>
+              </a:lightRig>
+            </a:scene3d>
+            <a:sp3d contourW="25400" prstMaterial="matte">
+              <a:bevelT w="25400" h="55880" prst="artDeco"/>
+              <a:contourClr>
+                <a:schemeClr val="accent2">
+                  <a:tint val="20000"/>
+                </a:schemeClr>
+              </a:contourClr>
+            </a:sp3d>
+          </a:bodyPr>
+          <a:lstStyle>
+            <a:lvl1pPr algn="ctr" defTabSz="457200" rtl="0" eaLnBrk="1" latinLnBrk="0" hangingPunct="1">
+              <a:spcBef>
+                <a:spcPct val="0"/>
+              </a:spcBef>
+              <a:buNone/>
+              <a:defRPr sz="4400" kern="1200">
+                <a:solidFill>
+                  <a:schemeClr val="tx1"/>
+                </a:solidFill>
+                <a:latin typeface="+mj-lt"/>
+                <a:ea typeface="+mj-ea"/>
+                <a:cs typeface="+mj-cs"/>
+              </a:defRPr>
+            </a:lvl1pPr>
+          </a:lstStyle>
+          <a:p>
+            <a:r>
+              <a:rPr lang="en-US" sz="4000" b="1" i="1" spc="50" dirty="0" smtClean="0">
+                <a:ln w="11430"/>
+                <a:gradFill>
+                  <a:gsLst>
+                    <a:gs pos="25000">
+                      <a:schemeClr val="accent2">
+                        <a:satMod val="155000"/>
+                      </a:schemeClr>
+                    </a:gs>
+                    <a:gs pos="100000">
+                      <a:schemeClr val="accent2">
+                        <a:shade val="45000"/>
+                        <a:satMod val="165000"/>
+                      </a:schemeClr>
+                    </a:gs>
+                  </a:gsLst>
+                  <a:lin ang="5400000"/>
+                </a:gradFill>
+                <a:effectLst>
+                  <a:outerShdw blurRad="76200" dist="50800" dir="5400000" algn="tl" rotWithShape="0">
+                    <a:srgbClr val="000000">
+                      <a:alpha val="65000"/>
+                    </a:srgbClr>
+                  </a:outerShdw>
+                </a:effectLst>
+                <a:latin typeface="Bookman Old Style"/>
+                <a:cs typeface="Bookman Old Style"/>
+              </a:rPr>
+              <a:t>E</a:t>
+            </a:r>
+            <a:r>
+              <a:rPr lang="en-US" sz="2400" b="1" i="1" spc="50" dirty="0" smtClean="0">
+                <a:ln w="11430"/>
+                <a:gradFill>
+                  <a:gsLst>
+                    <a:gs pos="25000">
+                      <a:schemeClr val="accent2">
+                        <a:satMod val="155000"/>
+                      </a:schemeClr>
+                    </a:gs>
+                    <a:gs pos="100000">
+                      <a:schemeClr val="accent2">
+                        <a:shade val="45000"/>
+                        <a:satMod val="165000"/>
+                      </a:schemeClr>
+                    </a:gs>
+                  </a:gsLst>
+                  <a:lin ang="5400000"/>
+                </a:gradFill>
+                <a:effectLst>
+                  <a:outerShdw blurRad="76200" dist="50800" dir="5400000" algn="tl" rotWithShape="0">
+                    <a:srgbClr val="000000">
+                      <a:alpha val="65000"/>
+                    </a:srgbClr>
+                  </a:outerShdw>
+                </a:effectLst>
+                <a:latin typeface="Bookman Old Style"/>
+                <a:cs typeface="Bookman Old Style"/>
+              </a:rPr>
+              <a:t>quilibrate</a:t>
+            </a:r>
+            <a:r>
+              <a:rPr lang="en-US" sz="2400" b="1" i="1" spc="50" baseline="-25000" dirty="0" smtClean="0">
+                <a:ln w="11430"/>
+                <a:gradFill>
+                  <a:gsLst>
+                    <a:gs pos="25000">
+                      <a:schemeClr val="accent2">
+                        <a:satMod val="155000"/>
+                      </a:schemeClr>
+                    </a:gs>
+                    <a:gs pos="100000">
+                      <a:schemeClr val="accent2">
+                        <a:shade val="45000"/>
+                        <a:satMod val="165000"/>
+                      </a:schemeClr>
+                    </a:gs>
+                  </a:gsLst>
+                  <a:lin ang="5400000"/>
+                </a:gradFill>
+                <a:effectLst>
+                  <a:outerShdw blurRad="76200" dist="50800" dir="5400000" algn="tl" rotWithShape="0">
+                    <a:srgbClr val="000000">
+                      <a:alpha val="65000"/>
+                    </a:srgbClr>
+                  </a:outerShdw>
+                </a:effectLst>
+                <a:latin typeface="Bookman Old Style"/>
+                <a:cs typeface="Bookman Old Style"/>
+              </a:rPr>
+              <a:t>1</a:t>
+            </a:r>
+            <a:endParaRPr lang="en-US" sz="2400" b="1" i="1" spc="50" dirty="0">
+              <a:ln w="11430"/>
+              <a:gradFill>
+                <a:gsLst>
+                  <a:gs pos="25000">
+                    <a:schemeClr val="accent2">
+                      <a:satMod val="155000"/>
+                    </a:schemeClr>
+                  </a:gs>
+                  <a:gs pos="100000">
+                    <a:schemeClr val="accent2">
+                      <a:shade val="45000"/>
+                      <a:satMod val="165000"/>
+                    </a:schemeClr>
+                  </a:gs>
+                </a:gsLst>
+                <a:lin ang="5400000"/>
+              </a:gradFill>
+              <a:effectLst>
+                <a:outerShdw blurRad="76200" dist="50800" dir="5400000" algn="tl" rotWithShape="0">
+                  <a:srgbClr val="000000">
+                    <a:alpha val="65000"/>
+                  </a:srgbClr>
+                </a:outerShdw>
+              </a:effectLst>
+              <a:latin typeface="Bookman Old Style"/>
+              <a:cs typeface="Bookman Old Style"/>
+            </a:endParaRPr>
+          </a:p>
+        </p:txBody>
+      </p:sp>
+      <p:sp>
+        <p:nvSpPr>
+          <p:cNvPr id="8" name="Title 1"/>
+          <p:cNvSpPr txBox="1">
+            <a:spLocks/>
+          </p:cNvSpPr>
+          <p:nvPr/>
+        </p:nvSpPr>
+        <p:spPr>
+          <a:xfrm>
+            <a:off x="490663" y="4445154"/>
+            <a:ext cx="3535655" cy="914400"/>
+          </a:xfrm>
+          <a:prstGeom prst="rect">
+            <a:avLst/>
+          </a:prstGeom>
+        </p:spPr>
+        <p:txBody>
+          <a:bodyPr vert="horz" lIns="91440" tIns="45720" rIns="91440" bIns="45720" rtlCol="0" anchor="ctr">
+            <a:normAutofit fontScale="85000" lnSpcReduction="10000"/>
             <a:scene3d>
               <a:camera prst="orthographicFront"/>
               <a:lightRig rig="soft" dir="tl">
@@ -3587,7 +3885,7 @@
                 <a:latin typeface="Bookman Old Style"/>
                 <a:cs typeface="Bookman Old Style"/>
               </a:rPr>
-              <a:t>E</a:t>
+              <a:t>Equilibrate</a:t>
             </a:r>
             <a:r>
               <a:rPr lang="en-US" b="1" i="1" spc="50" baseline="-25000" dirty="0" smtClean="0">
@@ -3618,7 +3916,7 @@
                 <a:latin typeface="Bookman Old Style"/>
                 <a:cs typeface="Bookman Old Style"/>
               </a:rPr>
-              <a:t>1</a:t>
+              <a:t>2</a:t>
             </a:r>
             <a:endParaRPr lang="en-US" b="1" i="1" spc="50" dirty="0">
               <a:ln w="11430"/>
@@ -3653,7 +3951,7 @@
       </p:sp>
       <p:sp>
         <p:nvSpPr>
-          <p:cNvPr id="8" name="Title 1"/>
+          <p:cNvPr id="9" name="Title 1"/>
           <p:cNvSpPr txBox="1">
             <a:spLocks/>
           </p:cNvSpPr>
@@ -3661,8 +3959,8 @@
         </p:nvSpPr>
         <p:spPr>
           <a:xfrm>
-            <a:off x="5438465" y="2352760"/>
-            <a:ext cx="909786" cy="914400"/>
+            <a:off x="467013" y="0"/>
+            <a:ext cx="2428001" cy="914400"/>
           </a:xfrm>
           <a:prstGeom prst="rect">
             <a:avLst/>
@@ -3704,152 +4002,7 @@
           </a:lstStyle>
           <a:p>
             <a:r>
-              <a:rPr lang="en-US" b="1" i="1" spc="50" dirty="0" smtClean="0">
-                <a:ln w="11430"/>
-                <a:gradFill>
-                  <a:gsLst>
-                    <a:gs pos="25000">
-                      <a:schemeClr val="accent2">
-                        <a:satMod val="155000"/>
-                      </a:schemeClr>
-                    </a:gs>
-                    <a:gs pos="100000">
-                      <a:schemeClr val="accent2">
-                        <a:shade val="45000"/>
-                        <a:satMod val="165000"/>
-                      </a:schemeClr>
-                    </a:gs>
-                  </a:gsLst>
-                  <a:lin ang="5400000"/>
-                </a:gradFill>
-                <a:effectLst>
-                  <a:outerShdw blurRad="76200" dist="50800" dir="5400000" algn="tl" rotWithShape="0">
-                    <a:srgbClr val="000000">
-                      <a:alpha val="65000"/>
-                    </a:srgbClr>
-                  </a:outerShdw>
-                </a:effectLst>
-                <a:latin typeface="Bookman Old Style"/>
-                <a:cs typeface="Bookman Old Style"/>
-              </a:rPr>
-              <a:t>E</a:t>
-            </a:r>
-            <a:r>
-              <a:rPr lang="en-US" b="1" i="1" spc="50" baseline="-25000" dirty="0">
-                <a:ln w="11430"/>
-                <a:gradFill>
-                  <a:gsLst>
-                    <a:gs pos="25000">
-                      <a:schemeClr val="accent2">
-                        <a:satMod val="155000"/>
-                      </a:schemeClr>
-                    </a:gs>
-                    <a:gs pos="100000">
-                      <a:schemeClr val="accent2">
-                        <a:shade val="45000"/>
-                        <a:satMod val="165000"/>
-                      </a:schemeClr>
-                    </a:gs>
-                  </a:gsLst>
-                  <a:lin ang="5400000"/>
-                </a:gradFill>
-                <a:effectLst>
-                  <a:outerShdw blurRad="76200" dist="50800" dir="5400000" algn="tl" rotWithShape="0">
-                    <a:srgbClr val="000000">
-                      <a:alpha val="65000"/>
-                    </a:srgbClr>
-                  </a:outerShdw>
-                </a:effectLst>
-                <a:latin typeface="Bookman Old Style"/>
-                <a:cs typeface="Bookman Old Style"/>
-              </a:rPr>
-              <a:t>2</a:t>
-            </a:r>
-            <a:endParaRPr lang="en-US" b="1" i="1" spc="50" dirty="0">
-              <a:ln w="11430"/>
-              <a:gradFill>
-                <a:gsLst>
-                  <a:gs pos="25000">
-                    <a:schemeClr val="accent2">
-                      <a:satMod val="155000"/>
-                    </a:schemeClr>
-                  </a:gs>
-                  <a:gs pos="100000">
-                    <a:schemeClr val="accent2">
-                      <a:shade val="45000"/>
-                      <a:satMod val="165000"/>
-                    </a:schemeClr>
-                  </a:gs>
-                </a:gsLst>
-                <a:lin ang="5400000"/>
-              </a:gradFill>
-              <a:effectLst>
-                <a:outerShdw blurRad="76200" dist="50800" dir="5400000" algn="tl" rotWithShape="0">
-                  <a:srgbClr val="000000">
-                    <a:alpha val="65000"/>
-                  </a:srgbClr>
-                </a:outerShdw>
-              </a:effectLst>
-              <a:latin typeface="Bookman Old Style"/>
-              <a:cs typeface="Bookman Old Style"/>
-            </a:endParaRPr>
-          </a:p>
-        </p:txBody>
-      </p:sp>
-      <p:sp>
-        <p:nvSpPr>
-          <p:cNvPr id="9" name="Title 1"/>
-          <p:cNvSpPr txBox="1">
-            <a:spLocks/>
-          </p:cNvSpPr>
-          <p:nvPr/>
-        </p:nvSpPr>
-        <p:spPr>
-          <a:xfrm>
-            <a:off x="3010465" y="2321062"/>
-            <a:ext cx="909786" cy="914400"/>
-          </a:xfrm>
-          <a:prstGeom prst="rect">
-            <a:avLst/>
-          </a:prstGeom>
-        </p:spPr>
-        <p:txBody>
-          <a:bodyPr vert="horz" lIns="91440" tIns="45720" rIns="91440" bIns="45720" rtlCol="0" anchor="ctr">
-            <a:normAutofit/>
-            <a:scene3d>
-              <a:camera prst="orthographicFront"/>
-              <a:lightRig rig="soft" dir="tl">
-                <a:rot lat="0" lon="0" rev="0"/>
-              </a:lightRig>
-            </a:scene3d>
-            <a:sp3d contourW="25400" prstMaterial="matte">
-              <a:bevelT w="25400" h="55880" prst="artDeco"/>
-              <a:contourClr>
-                <a:schemeClr val="accent2">
-                  <a:tint val="20000"/>
-                </a:schemeClr>
-              </a:contourClr>
-            </a:sp3d>
-          </a:bodyPr>
-          <a:lstStyle>
-            <a:lvl1pPr algn="ctr" defTabSz="457200" rtl="0" eaLnBrk="1" latinLnBrk="0" hangingPunct="1">
-              <a:spcBef>
-                <a:spcPct val="0"/>
-              </a:spcBef>
-              <a:buNone/>
-              <a:defRPr sz="4400" kern="1200">
-                <a:solidFill>
-                  <a:schemeClr val="tx1"/>
-                </a:solidFill>
-                <a:latin typeface="+mj-lt"/>
-                <a:ea typeface="+mj-ea"/>
-                <a:cs typeface="+mj-cs"/>
-              </a:defRPr>
-            </a:lvl1pPr>
-          </a:lstStyle>
-          <a:p>
-            <a:r>
-              <a:rPr lang="en-US" b="1" i="1" spc="50" dirty="0" smtClean="0">
+              <a:rPr lang="en-US" sz="4000" b="1" i="1" spc="50" dirty="0" smtClean="0">
                 <a:ln w="11430"/>
                 <a:gradFill>
                   <a:gsLst>
@@ -3879,7 +4032,38 @@
               </a:rPr>
               <a:t>P</a:t>
             </a:r>
-            <a:endParaRPr lang="en-US" b="1" i="1" spc="50" dirty="0">
+            <a:r>
+              <a:rPr lang="en-US" sz="2400" b="1" i="1" spc="50" dirty="0" smtClean="0">
+                <a:ln w="11430"/>
+                <a:gradFill>
+                  <a:gsLst>
+                    <a:gs pos="25000">
+                      <a:schemeClr val="accent2">
+                        <a:satMod val="155000"/>
+                      </a:schemeClr>
+                    </a:gs>
+                    <a:gs pos="100000">
+                      <a:schemeClr val="accent2">
+                        <a:shade val="45000"/>
+                        <a:satMod val="165000"/>
+                      </a:schemeClr>
+                    </a:gs>
+                  </a:gsLst>
+                  <a:lin ang="5400000"/>
+                </a:gradFill>
+                <a:effectLst>
+                  <a:outerShdw blurRad="76200" dist="50800" dir="5400000" algn="tl" rotWithShape="0">
+                    <a:srgbClr val="000000">
+                      <a:alpha val="65000"/>
+                    </a:srgbClr>
+                  </a:outerShdw>
+                </a:effectLst>
+                <a:latin typeface="Bookman Old Style"/>
+                <a:cs typeface="Bookman Old Style"/>
+              </a:rPr>
+              <a:t>repare</a:t>
+            </a:r>
+            <a:endParaRPr lang="en-US" sz="2400" b="1" i="1" spc="50" dirty="0">
               <a:ln w="11430"/>
               <a:gradFill>
                 <a:gsLst>

</xml_diff>

<commit_message>
I made Equilibration phases menus work.
</commit_message>
<xml_diff>
--- a/images/icons.pptx
+++ b/images/icons.pptx
@@ -3107,8 +3107,8 @@
         </p:nvSpPr>
         <p:spPr>
           <a:xfrm>
-            <a:off x="108549" y="1438360"/>
-            <a:ext cx="2901916" cy="914400"/>
+            <a:off x="541481" y="2497685"/>
+            <a:ext cx="2286000" cy="914400"/>
           </a:xfrm>
         </p:spPr>
         <p:txBody>
@@ -3234,8 +3234,8 @@
         </p:nvSpPr>
         <p:spPr>
           <a:xfrm>
-            <a:off x="633905" y="818679"/>
-            <a:ext cx="1992130" cy="914400"/>
+            <a:off x="547320" y="732099"/>
+            <a:ext cx="1827537" cy="914400"/>
           </a:xfrm>
           <a:prstGeom prst="rect">
             <a:avLst/>
@@ -3379,8 +3379,8 @@
         </p:nvSpPr>
         <p:spPr>
           <a:xfrm>
-            <a:off x="633904" y="2309469"/>
-            <a:ext cx="2261109" cy="914400"/>
+            <a:off x="548387" y="1617959"/>
+            <a:ext cx="1828800" cy="914400"/>
           </a:xfrm>
           <a:prstGeom prst="rect">
             <a:avLst/>
@@ -3524,8 +3524,8 @@
         </p:nvSpPr>
         <p:spPr>
           <a:xfrm>
-            <a:off x="6603482" y="2285663"/>
-            <a:ext cx="909786" cy="914400"/>
+            <a:off x="532888" y="5532481"/>
+            <a:ext cx="2286000" cy="914400"/>
           </a:xfrm>
           <a:prstGeom prst="rect">
             <a:avLst/>
@@ -3533,7 +3533,7 @@
         </p:spPr>
         <p:txBody>
           <a:bodyPr vert="horz" lIns="91440" tIns="45720" rIns="91440" bIns="45720" rtlCol="0" anchor="ctr">
-            <a:normAutofit/>
+            <a:noAutofit/>
             <a:scene3d>
               <a:camera prst="orthographicFront"/>
               <a:lightRig rig="soft" dir="tl">
@@ -3567,7 +3567,7 @@
           </a:lstStyle>
           <a:p>
             <a:r>
-              <a:rPr lang="en-US" b="1" i="1" spc="50" dirty="0" smtClean="0">
+              <a:rPr lang="en-US" sz="4000" b="1" i="1" spc="50" dirty="0" smtClean="0">
                 <a:ln w="11430"/>
                 <a:gradFill>
                   <a:gsLst>
@@ -3595,9 +3595,40 @@
                 <a:latin typeface="Bookman Old Style"/>
                 <a:cs typeface="Bookman Old Style"/>
               </a:rPr>
-              <a:t>R</a:t>
-            </a:r>
-            <a:endParaRPr lang="en-US" b="1" i="1" spc="50" dirty="0">
+              <a:t>P</a:t>
+            </a:r>
+            <a:r>
+              <a:rPr lang="en-US" sz="2400" b="1" i="1" spc="50" dirty="0" smtClean="0">
+                <a:ln w="11430"/>
+                <a:gradFill>
+                  <a:gsLst>
+                    <a:gs pos="25000">
+                      <a:schemeClr val="accent2">
+                        <a:satMod val="155000"/>
+                      </a:schemeClr>
+                    </a:gs>
+                    <a:gs pos="100000">
+                      <a:schemeClr val="accent2">
+                        <a:shade val="45000"/>
+                        <a:satMod val="165000"/>
+                      </a:schemeClr>
+                    </a:gs>
+                  </a:gsLst>
+                  <a:lin ang="5400000"/>
+                </a:gradFill>
+                <a:effectLst>
+                  <a:outerShdw blurRad="76200" dist="50800" dir="5400000" algn="tl" rotWithShape="0">
+                    <a:srgbClr val="000000">
+                      <a:alpha val="65000"/>
+                    </a:srgbClr>
+                  </a:outerShdw>
+                </a:effectLst>
+                <a:latin typeface="Bookman Old Style"/>
+                <a:cs typeface="Bookman Old Style"/>
+              </a:rPr>
+              <a:t>roduction</a:t>
+            </a:r>
+            <a:endParaRPr lang="en-US" sz="2400" b="1" i="1" spc="50" dirty="0">
               <a:ln w="11430"/>
               <a:gradFill>
                 <a:gsLst>
@@ -3638,8 +3669,8 @@
         </p:nvSpPr>
         <p:spPr>
           <a:xfrm>
-            <a:off x="467012" y="3282211"/>
-            <a:ext cx="3559306" cy="914400"/>
+            <a:off x="553598" y="3282211"/>
+            <a:ext cx="2377440" cy="914400"/>
           </a:xfrm>
           <a:prstGeom prst="rect">
             <a:avLst/>
@@ -3814,8 +3845,8 @@
         </p:nvSpPr>
         <p:spPr>
           <a:xfrm>
-            <a:off x="490663" y="4445154"/>
-            <a:ext cx="3535655" cy="914400"/>
+            <a:off x="562818" y="4445154"/>
+            <a:ext cx="2377440" cy="914400"/>
           </a:xfrm>
           <a:prstGeom prst="rect">
             <a:avLst/>
@@ -3823,7 +3854,7 @@
         </p:spPr>
         <p:txBody>
           <a:bodyPr vert="horz" lIns="91440" tIns="45720" rIns="91440" bIns="45720" rtlCol="0" anchor="ctr">
-            <a:normAutofit fontScale="85000" lnSpcReduction="10000"/>
+            <a:normAutofit/>
             <a:scene3d>
               <a:camera prst="orthographicFront"/>
               <a:lightRig rig="soft" dir="tl">
@@ -3857,7 +3888,7 @@
           </a:lstStyle>
           <a:p>
             <a:r>
-              <a:rPr lang="en-US" b="1" i="1" spc="50" dirty="0" smtClean="0">
+              <a:rPr lang="en-US" sz="4000" b="1" i="1" spc="50" dirty="0" smtClean="0">
                 <a:ln w="11430"/>
                 <a:gradFill>
                   <a:gsLst>
@@ -3885,10 +3916,41 @@
                 <a:latin typeface="Bookman Old Style"/>
                 <a:cs typeface="Bookman Old Style"/>
               </a:rPr>
-              <a:t>Equilibrate</a:t>
-            </a:r>
-            <a:r>
-              <a:rPr lang="en-US" b="1" i="1" spc="50" baseline="-25000" dirty="0" smtClean="0">
+              <a:t>E</a:t>
+            </a:r>
+            <a:r>
+              <a:rPr lang="en-US" sz="2400" b="1" i="1" spc="50" dirty="0" smtClean="0">
+                <a:ln w="11430"/>
+                <a:gradFill>
+                  <a:gsLst>
+                    <a:gs pos="25000">
+                      <a:schemeClr val="accent2">
+                        <a:satMod val="155000"/>
+                      </a:schemeClr>
+                    </a:gs>
+                    <a:gs pos="100000">
+                      <a:schemeClr val="accent2">
+                        <a:shade val="45000"/>
+                        <a:satMod val="165000"/>
+                      </a:schemeClr>
+                    </a:gs>
+                  </a:gsLst>
+                  <a:lin ang="5400000"/>
+                </a:gradFill>
+                <a:effectLst>
+                  <a:outerShdw blurRad="76200" dist="50800" dir="5400000" algn="tl" rotWithShape="0">
+                    <a:srgbClr val="000000">
+                      <a:alpha val="65000"/>
+                    </a:srgbClr>
+                  </a:outerShdw>
+                </a:effectLst>
+                <a:latin typeface="Bookman Old Style"/>
+                <a:cs typeface="Bookman Old Style"/>
+              </a:rPr>
+              <a:t>quilibrate</a:t>
+            </a:r>
+            <a:r>
+              <a:rPr lang="en-US" sz="2400" b="1" i="1" spc="50" baseline="-25000" dirty="0" smtClean="0">
                 <a:ln w="11430"/>
                 <a:gradFill>
                   <a:gsLst>
@@ -3918,7 +3980,7 @@
               </a:rPr>
               <a:t>2</a:t>
             </a:r>
-            <a:endParaRPr lang="en-US" b="1" i="1" spc="50" dirty="0">
+            <a:endParaRPr lang="en-US" sz="2400" b="1" i="1" spc="50" dirty="0">
               <a:ln w="11430"/>
               <a:gradFill>
                 <a:gsLst>
@@ -3959,8 +4021,8 @@
         </p:nvSpPr>
         <p:spPr>
           <a:xfrm>
-            <a:off x="467013" y="0"/>
-            <a:ext cx="2428001" cy="914400"/>
+            <a:off x="553599" y="0"/>
+            <a:ext cx="1828800" cy="914400"/>
           </a:xfrm>
           <a:prstGeom prst="rect">
             <a:avLst/>

</xml_diff>

<commit_message>
Icon set has been updated.
</commit_message>
<xml_diff>
--- a/images/icons.pptx
+++ b/images/icons.pptx
@@ -288,7 +288,7 @@
           <a:p>
             <a:fld id="{CD851AF9-628A-D441-9A3F-0E66B844A3C7}" type="datetimeFigureOut">
               <a:rPr lang="en-US" smtClean="0"/>
-              <a:t>10/29/14</a:t>
+              <a:t>11/4/14</a:t>
             </a:fld>
             <a:endParaRPr lang="en-US"/>
           </a:p>
@@ -458,7 +458,7 @@
           <a:p>
             <a:fld id="{CD851AF9-628A-D441-9A3F-0E66B844A3C7}" type="datetimeFigureOut">
               <a:rPr lang="en-US" smtClean="0"/>
-              <a:t>10/29/14</a:t>
+              <a:t>11/4/14</a:t>
             </a:fld>
             <a:endParaRPr lang="en-US"/>
           </a:p>
@@ -638,7 +638,7 @@
           <a:p>
             <a:fld id="{CD851AF9-628A-D441-9A3F-0E66B844A3C7}" type="datetimeFigureOut">
               <a:rPr lang="en-US" smtClean="0"/>
-              <a:t>10/29/14</a:t>
+              <a:t>11/4/14</a:t>
             </a:fld>
             <a:endParaRPr lang="en-US"/>
           </a:p>
@@ -808,7 +808,7 @@
           <a:p>
             <a:fld id="{CD851AF9-628A-D441-9A3F-0E66B844A3C7}" type="datetimeFigureOut">
               <a:rPr lang="en-US" smtClean="0"/>
-              <a:t>10/29/14</a:t>
+              <a:t>11/4/14</a:t>
             </a:fld>
             <a:endParaRPr lang="en-US"/>
           </a:p>
@@ -1054,7 +1054,7 @@
           <a:p>
             <a:fld id="{CD851AF9-628A-D441-9A3F-0E66B844A3C7}" type="datetimeFigureOut">
               <a:rPr lang="en-US" smtClean="0"/>
-              <a:t>10/29/14</a:t>
+              <a:t>11/4/14</a:t>
             </a:fld>
             <a:endParaRPr lang="en-US"/>
           </a:p>
@@ -1342,7 +1342,7 @@
           <a:p>
             <a:fld id="{CD851AF9-628A-D441-9A3F-0E66B844A3C7}" type="datetimeFigureOut">
               <a:rPr lang="en-US" smtClean="0"/>
-              <a:t>10/29/14</a:t>
+              <a:t>11/4/14</a:t>
             </a:fld>
             <a:endParaRPr lang="en-US"/>
           </a:p>
@@ -1764,7 +1764,7 @@
           <a:p>
             <a:fld id="{CD851AF9-628A-D441-9A3F-0E66B844A3C7}" type="datetimeFigureOut">
               <a:rPr lang="en-US" smtClean="0"/>
-              <a:t>10/29/14</a:t>
+              <a:t>11/4/14</a:t>
             </a:fld>
             <a:endParaRPr lang="en-US"/>
           </a:p>
@@ -1882,7 +1882,7 @@
           <a:p>
             <a:fld id="{CD851AF9-628A-D441-9A3F-0E66B844A3C7}" type="datetimeFigureOut">
               <a:rPr lang="en-US" smtClean="0"/>
-              <a:t>10/29/14</a:t>
+              <a:t>11/4/14</a:t>
             </a:fld>
             <a:endParaRPr lang="en-US"/>
           </a:p>
@@ -1977,7 +1977,7 @@
           <a:p>
             <a:fld id="{CD851AF9-628A-D441-9A3F-0E66B844A3C7}" type="datetimeFigureOut">
               <a:rPr lang="en-US" smtClean="0"/>
-              <a:t>10/29/14</a:t>
+              <a:t>11/4/14</a:t>
             </a:fld>
             <a:endParaRPr lang="en-US"/>
           </a:p>
@@ -2254,7 +2254,7 @@
           <a:p>
             <a:fld id="{CD851AF9-628A-D441-9A3F-0E66B844A3C7}" type="datetimeFigureOut">
               <a:rPr lang="en-US" smtClean="0"/>
-              <a:t>10/29/14</a:t>
+              <a:t>11/4/14</a:t>
             </a:fld>
             <a:endParaRPr lang="en-US"/>
           </a:p>
@@ -2507,7 +2507,7 @@
           <a:p>
             <a:fld id="{CD851AF9-628A-D441-9A3F-0E66B844A3C7}" type="datetimeFigureOut">
               <a:rPr lang="en-US" smtClean="0"/>
-              <a:t>10/29/14</a:t>
+              <a:t>11/4/14</a:t>
             </a:fld>
             <a:endParaRPr lang="en-US"/>
           </a:p>
@@ -2720,7 +2720,7 @@
           <a:p>
             <a:fld id="{CD851AF9-628A-D441-9A3F-0E66B844A3C7}" type="datetimeFigureOut">
               <a:rPr lang="en-US" smtClean="0"/>
-              <a:t>10/29/14</a:t>
+              <a:t>11/4/14</a:t>
             </a:fld>
             <a:endParaRPr lang="en-US"/>
           </a:p>
@@ -3567,7 +3567,7 @@
           </a:lstStyle>
           <a:p>
             <a:r>
-              <a:rPr lang="en-US" sz="4000" b="1" i="1" spc="50" dirty="0" smtClean="0">
+              <a:rPr lang="en-US" sz="4000" b="1" i="1" spc="50" smtClean="0">
                 <a:ln w="11430"/>
                 <a:gradFill>
                   <a:gsLst>
@@ -3598,7 +3598,7 @@
               <a:t>P</a:t>
             </a:r>
             <a:r>
-              <a:rPr lang="en-US" sz="2400" b="1" i="1" spc="50" dirty="0" smtClean="0">
+              <a:rPr lang="en-US" sz="2400" b="1" i="1" spc="50" smtClean="0">
                 <a:ln w="11430"/>
                 <a:gradFill>
                   <a:gsLst>
@@ -3626,7 +3626,7 @@
                 <a:latin typeface="Bookman Old Style"/>
                 <a:cs typeface="Bookman Old Style"/>
               </a:rPr>
-              <a:t>roduction</a:t>
+              <a:t>reduction</a:t>
             </a:r>
             <a:endParaRPr lang="en-US" sz="2400" b="1" i="1" spc="50" dirty="0">
               <a:ln w="11430"/>
@@ -3669,8 +3669,8 @@
         </p:nvSpPr>
         <p:spPr>
           <a:xfrm>
-            <a:off x="553598" y="3282211"/>
-            <a:ext cx="2377440" cy="914400"/>
+            <a:off x="553597" y="3282211"/>
+            <a:ext cx="2693433" cy="914400"/>
           </a:xfrm>
           <a:prstGeom prst="rect">
             <a:avLst/>
@@ -3712,7 +3712,7 @@
           </a:lstStyle>
           <a:p>
             <a:r>
-              <a:rPr lang="en-US" sz="4000" b="1" i="1" spc="50" dirty="0" smtClean="0">
+              <a:rPr lang="en-US" sz="4000" b="1" i="1" spc="50" dirty="0" err="1" smtClean="0">
                 <a:ln w="11430"/>
                 <a:gradFill>
                   <a:gsLst>
@@ -3743,7 +3743,7 @@
               <a:t>E</a:t>
             </a:r>
             <a:r>
-              <a:rPr lang="en-US" sz="2400" b="1" i="1" spc="50" dirty="0" smtClean="0">
+              <a:rPr lang="en-US" sz="2400" b="1" i="1" spc="50" dirty="0" err="1" smtClean="0">
                 <a:ln w="11430"/>
                 <a:gradFill>
                   <a:gsLst>
@@ -3774,7 +3774,7 @@
               <a:t>quilibrate</a:t>
             </a:r>
             <a:r>
-              <a:rPr lang="en-US" sz="2400" b="1" i="1" spc="50" baseline="-25000" dirty="0" smtClean="0">
+              <a:rPr lang="en-US" sz="2400" b="1" i="1" spc="50" baseline="-25000" dirty="0" err="1" smtClean="0">
                 <a:ln w="11430"/>
                 <a:gradFill>
                   <a:gsLst>
@@ -3802,7 +3802,7 @@
                 <a:latin typeface="Bookman Old Style"/>
                 <a:cs typeface="Bookman Old Style"/>
               </a:rPr>
-              <a:t>1</a:t>
+              <a:t>NVT</a:t>
             </a:r>
             <a:endParaRPr lang="en-US" sz="2400" b="1" i="1" spc="50" dirty="0">
               <a:ln w="11430"/>
@@ -3846,7 +3846,7 @@
         <p:spPr>
           <a:xfrm>
             <a:off x="562818" y="4445154"/>
-            <a:ext cx="2377440" cy="914400"/>
+            <a:ext cx="2684212" cy="914400"/>
           </a:xfrm>
           <a:prstGeom prst="rect">
             <a:avLst/>
@@ -3888,7 +3888,7 @@
           </a:lstStyle>
           <a:p>
             <a:r>
-              <a:rPr lang="en-US" sz="4000" b="1" i="1" spc="50" dirty="0" smtClean="0">
+              <a:rPr lang="en-US" sz="4000" b="1" i="1" spc="50" dirty="0" err="1" smtClean="0">
                 <a:ln w="11430"/>
                 <a:gradFill>
                   <a:gsLst>
@@ -3919,7 +3919,7 @@
               <a:t>E</a:t>
             </a:r>
             <a:r>
-              <a:rPr lang="en-US" sz="2400" b="1" i="1" spc="50" dirty="0" smtClean="0">
+              <a:rPr lang="en-US" sz="2400" b="1" i="1" spc="50" dirty="0" err="1" smtClean="0">
                 <a:ln w="11430"/>
                 <a:gradFill>
                   <a:gsLst>
@@ -3950,7 +3950,7 @@
               <a:t>quilibrate</a:t>
             </a:r>
             <a:r>
-              <a:rPr lang="en-US" sz="2400" b="1" i="1" spc="50" baseline="-25000" dirty="0" smtClean="0">
+              <a:rPr lang="en-US" sz="2400" b="1" i="1" spc="50" baseline="-25000" dirty="0" err="1" smtClean="0">
                 <a:ln w="11430"/>
                 <a:gradFill>
                   <a:gsLst>
@@ -3978,7 +3978,7 @@
                 <a:latin typeface="Bookman Old Style"/>
                 <a:cs typeface="Bookman Old Style"/>
               </a:rPr>
-              <a:t>2</a:t>
+              <a:t>NPT</a:t>
             </a:r>
             <a:endParaRPr lang="en-US" sz="2400" b="1" i="1" spc="50" dirty="0">
               <a:ln w="11430"/>

</xml_diff>

<commit_message>
Added: In Equilibrate_NVT phase, user is asked to set temperature.
</commit_message>
<xml_diff>
--- a/images/icons.pptx
+++ b/images/icons.pptx
@@ -3157,8 +3157,8 @@
                     </a:srgbClr>
                   </a:outerShdw>
                 </a:effectLst>
-                <a:latin typeface="Bookman Old Style"/>
-                <a:cs typeface="Bookman Old Style"/>
+                <a:latin typeface="Arial"/>
+                <a:cs typeface="Arial"/>
               </a:rPr>
               <a:t>M</a:t>
             </a:r>
@@ -3188,8 +3188,8 @@
                     </a:srgbClr>
                   </a:outerShdw>
                 </a:effectLst>
-                <a:latin typeface="Bookman Old Style"/>
-                <a:cs typeface="Bookman Old Style"/>
+                <a:latin typeface="Arial"/>
+                <a:cs typeface="Arial"/>
               </a:rPr>
               <a:t>inimize</a:t>
             </a:r>
@@ -3218,8 +3218,8 @@
                   </a:srgbClr>
                 </a:outerShdw>
               </a:effectLst>
-              <a:latin typeface="Bookman Old Style"/>
-              <a:cs typeface="Bookman Old Style"/>
+              <a:latin typeface="Arial"/>
+              <a:cs typeface="Arial"/>
             </a:endParaRPr>
           </a:p>
         </p:txBody>
@@ -3302,8 +3302,8 @@
                     </a:srgbClr>
                   </a:outerShdw>
                 </a:effectLst>
-                <a:latin typeface="Bookman Old Style"/>
-                <a:cs typeface="Bookman Old Style"/>
+                <a:latin typeface="Arial"/>
+                <a:cs typeface="Arial"/>
               </a:rPr>
               <a:t>S</a:t>
             </a:r>
@@ -3333,8 +3333,8 @@
                     </a:srgbClr>
                   </a:outerShdw>
                 </a:effectLst>
-                <a:latin typeface="Bookman Old Style"/>
-                <a:cs typeface="Bookman Old Style"/>
+                <a:latin typeface="Arial"/>
+                <a:cs typeface="Arial"/>
               </a:rPr>
               <a:t>olvate</a:t>
             </a:r>
@@ -3363,8 +3363,8 @@
                   </a:srgbClr>
                 </a:outerShdw>
               </a:effectLst>
-              <a:latin typeface="Bookman Old Style"/>
-              <a:cs typeface="Bookman Old Style"/>
+              <a:latin typeface="Arial"/>
+              <a:cs typeface="Arial"/>
             </a:endParaRPr>
           </a:p>
         </p:txBody>
@@ -3447,8 +3447,8 @@
                     </a:srgbClr>
                   </a:outerShdw>
                 </a:effectLst>
-                <a:latin typeface="Bookman Old Style"/>
-                <a:cs typeface="Bookman Old Style"/>
+                <a:latin typeface="Arial"/>
+                <a:cs typeface="Arial"/>
               </a:rPr>
               <a:t>I</a:t>
             </a:r>
@@ -3478,8 +3478,8 @@
                     </a:srgbClr>
                   </a:outerShdw>
                 </a:effectLst>
-                <a:latin typeface="Bookman Old Style"/>
-                <a:cs typeface="Bookman Old Style"/>
+                <a:latin typeface="Arial"/>
+                <a:cs typeface="Arial"/>
               </a:rPr>
               <a:t>onize</a:t>
             </a:r>
@@ -3508,8 +3508,8 @@
                   </a:srgbClr>
                 </a:outerShdw>
               </a:effectLst>
-              <a:latin typeface="Bookman Old Style"/>
-              <a:cs typeface="Bookman Old Style"/>
+              <a:latin typeface="Arial"/>
+              <a:cs typeface="Arial"/>
             </a:endParaRPr>
           </a:p>
         </p:txBody>
@@ -3567,7 +3567,7 @@
           </a:lstStyle>
           <a:p>
             <a:r>
-              <a:rPr lang="en-US" sz="4000" b="1" i="1" spc="50" smtClean="0">
+              <a:rPr lang="en-US" sz="4000" b="1" i="1" spc="50" dirty="0" err="1" smtClean="0">
                 <a:ln w="11430"/>
                 <a:gradFill>
                   <a:gsLst>
@@ -3592,13 +3592,13 @@
                     </a:srgbClr>
                   </a:outerShdw>
                 </a:effectLst>
-                <a:latin typeface="Bookman Old Style"/>
-                <a:cs typeface="Bookman Old Style"/>
+                <a:latin typeface="Arial"/>
+                <a:cs typeface="Arial"/>
               </a:rPr>
               <a:t>P</a:t>
             </a:r>
             <a:r>
-              <a:rPr lang="en-US" sz="2400" b="1" i="1" spc="50" smtClean="0">
+              <a:rPr lang="en-US" sz="2400" b="1" i="1" spc="50" dirty="0" err="1" smtClean="0">
                 <a:ln w="11430"/>
                 <a:gradFill>
                   <a:gsLst>
@@ -3623,8 +3623,8 @@
                     </a:srgbClr>
                   </a:outerShdw>
                 </a:effectLst>
-                <a:latin typeface="Bookman Old Style"/>
-                <a:cs typeface="Bookman Old Style"/>
+                <a:latin typeface="Arial"/>
+                <a:cs typeface="Arial"/>
               </a:rPr>
               <a:t>reduction</a:t>
             </a:r>
@@ -3653,8 +3653,8 @@
                   </a:srgbClr>
                 </a:outerShdw>
               </a:effectLst>
-              <a:latin typeface="Bookman Old Style"/>
-              <a:cs typeface="Bookman Old Style"/>
+              <a:latin typeface="Arial"/>
+              <a:cs typeface="Arial"/>
             </a:endParaRPr>
           </a:p>
         </p:txBody>
@@ -3737,8 +3737,8 @@
                     </a:srgbClr>
                   </a:outerShdw>
                 </a:effectLst>
-                <a:latin typeface="Bookman Old Style"/>
-                <a:cs typeface="Bookman Old Style"/>
+                <a:latin typeface="Arial"/>
+                <a:cs typeface="Arial"/>
               </a:rPr>
               <a:t>E</a:t>
             </a:r>
@@ -3768,8 +3768,8 @@
                     </a:srgbClr>
                   </a:outerShdw>
                 </a:effectLst>
-                <a:latin typeface="Bookman Old Style"/>
-                <a:cs typeface="Bookman Old Style"/>
+                <a:latin typeface="Arial"/>
+                <a:cs typeface="Arial"/>
               </a:rPr>
               <a:t>quilibrate</a:t>
             </a:r>
@@ -3799,8 +3799,8 @@
                     </a:srgbClr>
                   </a:outerShdw>
                 </a:effectLst>
-                <a:latin typeface="Bookman Old Style"/>
-                <a:cs typeface="Bookman Old Style"/>
+                <a:latin typeface="Arial"/>
+                <a:cs typeface="Arial"/>
               </a:rPr>
               <a:t>NVT</a:t>
             </a:r>
@@ -3829,8 +3829,8 @@
                   </a:srgbClr>
                 </a:outerShdw>
               </a:effectLst>
-              <a:latin typeface="Bookman Old Style"/>
-              <a:cs typeface="Bookman Old Style"/>
+              <a:latin typeface="Arial"/>
+              <a:cs typeface="Arial"/>
             </a:endParaRPr>
           </a:p>
         </p:txBody>
@@ -3913,8 +3913,8 @@
                     </a:srgbClr>
                   </a:outerShdw>
                 </a:effectLst>
-                <a:latin typeface="Bookman Old Style"/>
-                <a:cs typeface="Bookman Old Style"/>
+                <a:latin typeface="Arial"/>
+                <a:cs typeface="Arial"/>
               </a:rPr>
               <a:t>E</a:t>
             </a:r>
@@ -3944,8 +3944,8 @@
                     </a:srgbClr>
                   </a:outerShdw>
                 </a:effectLst>
-                <a:latin typeface="Bookman Old Style"/>
-                <a:cs typeface="Bookman Old Style"/>
+                <a:latin typeface="Arial"/>
+                <a:cs typeface="Arial"/>
               </a:rPr>
               <a:t>quilibrate</a:t>
             </a:r>
@@ -3975,8 +3975,8 @@
                     </a:srgbClr>
                   </a:outerShdw>
                 </a:effectLst>
-                <a:latin typeface="Bookman Old Style"/>
-                <a:cs typeface="Bookman Old Style"/>
+                <a:latin typeface="Arial"/>
+                <a:cs typeface="Arial"/>
               </a:rPr>
               <a:t>NPT</a:t>
             </a:r>
@@ -4005,8 +4005,8 @@
                   </a:srgbClr>
                 </a:outerShdw>
               </a:effectLst>
-              <a:latin typeface="Bookman Old Style"/>
-              <a:cs typeface="Bookman Old Style"/>
+              <a:latin typeface="Arial"/>
+              <a:cs typeface="Arial"/>
             </a:endParaRPr>
           </a:p>
         </p:txBody>
@@ -4089,8 +4089,8 @@
                     </a:srgbClr>
                   </a:outerShdw>
                 </a:effectLst>
-                <a:latin typeface="Bookman Old Style"/>
-                <a:cs typeface="Bookman Old Style"/>
+                <a:latin typeface="Arial"/>
+                <a:cs typeface="Arial"/>
               </a:rPr>
               <a:t>P</a:t>
             </a:r>
@@ -4120,8 +4120,8 @@
                     </a:srgbClr>
                   </a:outerShdw>
                 </a:effectLst>
-                <a:latin typeface="Bookman Old Style"/>
-                <a:cs typeface="Bookman Old Style"/>
+                <a:latin typeface="Arial"/>
+                <a:cs typeface="Arial"/>
               </a:rPr>
               <a:t>repare</a:t>
             </a:r>
@@ -4150,8 +4150,8 @@
                   </a:srgbClr>
                 </a:outerShdw>
               </a:effectLst>
-              <a:latin typeface="Bookman Old Style"/>
-              <a:cs typeface="Bookman Old Style"/>
+              <a:latin typeface="Arial"/>
+              <a:cs typeface="Arial"/>
             </a:endParaRPr>
           </a:p>
         </p:txBody>

</xml_diff>

<commit_message>
A bunch of error messages has been added in case file path is null.
</commit_message>
<xml_diff>
--- a/images/icons.pptx
+++ b/images/icons.pptx
@@ -288,7 +288,7 @@
           <a:p>
             <a:fld id="{CD851AF9-628A-D441-9A3F-0E66B844A3C7}" type="datetimeFigureOut">
               <a:rPr lang="en-US" smtClean="0"/>
-              <a:t>11/4/14</a:t>
+              <a:t>11/12/14</a:t>
             </a:fld>
             <a:endParaRPr lang="en-US"/>
           </a:p>
@@ -458,7 +458,7 @@
           <a:p>
             <a:fld id="{CD851AF9-628A-D441-9A3F-0E66B844A3C7}" type="datetimeFigureOut">
               <a:rPr lang="en-US" smtClean="0"/>
-              <a:t>11/4/14</a:t>
+              <a:t>11/12/14</a:t>
             </a:fld>
             <a:endParaRPr lang="en-US"/>
           </a:p>
@@ -638,7 +638,7 @@
           <a:p>
             <a:fld id="{CD851AF9-628A-D441-9A3F-0E66B844A3C7}" type="datetimeFigureOut">
               <a:rPr lang="en-US" smtClean="0"/>
-              <a:t>11/4/14</a:t>
+              <a:t>11/12/14</a:t>
             </a:fld>
             <a:endParaRPr lang="en-US"/>
           </a:p>
@@ -808,7 +808,7 @@
           <a:p>
             <a:fld id="{CD851AF9-628A-D441-9A3F-0E66B844A3C7}" type="datetimeFigureOut">
               <a:rPr lang="en-US" smtClean="0"/>
-              <a:t>11/4/14</a:t>
+              <a:t>11/12/14</a:t>
             </a:fld>
             <a:endParaRPr lang="en-US"/>
           </a:p>
@@ -1054,7 +1054,7 @@
           <a:p>
             <a:fld id="{CD851AF9-628A-D441-9A3F-0E66B844A3C7}" type="datetimeFigureOut">
               <a:rPr lang="en-US" smtClean="0"/>
-              <a:t>11/4/14</a:t>
+              <a:t>11/12/14</a:t>
             </a:fld>
             <a:endParaRPr lang="en-US"/>
           </a:p>
@@ -1342,7 +1342,7 @@
           <a:p>
             <a:fld id="{CD851AF9-628A-D441-9A3F-0E66B844A3C7}" type="datetimeFigureOut">
               <a:rPr lang="en-US" smtClean="0"/>
-              <a:t>11/4/14</a:t>
+              <a:t>11/12/14</a:t>
             </a:fld>
             <a:endParaRPr lang="en-US"/>
           </a:p>
@@ -1764,7 +1764,7 @@
           <a:p>
             <a:fld id="{CD851AF9-628A-D441-9A3F-0E66B844A3C7}" type="datetimeFigureOut">
               <a:rPr lang="en-US" smtClean="0"/>
-              <a:t>11/4/14</a:t>
+              <a:t>11/12/14</a:t>
             </a:fld>
             <a:endParaRPr lang="en-US"/>
           </a:p>
@@ -1882,7 +1882,7 @@
           <a:p>
             <a:fld id="{CD851AF9-628A-D441-9A3F-0E66B844A3C7}" type="datetimeFigureOut">
               <a:rPr lang="en-US" smtClean="0"/>
-              <a:t>11/4/14</a:t>
+              <a:t>11/12/14</a:t>
             </a:fld>
             <a:endParaRPr lang="en-US"/>
           </a:p>
@@ -1977,7 +1977,7 @@
           <a:p>
             <a:fld id="{CD851AF9-628A-D441-9A3F-0E66B844A3C7}" type="datetimeFigureOut">
               <a:rPr lang="en-US" smtClean="0"/>
-              <a:t>11/4/14</a:t>
+              <a:t>11/12/14</a:t>
             </a:fld>
             <a:endParaRPr lang="en-US"/>
           </a:p>
@@ -2254,7 +2254,7 @@
           <a:p>
             <a:fld id="{CD851AF9-628A-D441-9A3F-0E66B844A3C7}" type="datetimeFigureOut">
               <a:rPr lang="en-US" smtClean="0"/>
-              <a:t>11/4/14</a:t>
+              <a:t>11/12/14</a:t>
             </a:fld>
             <a:endParaRPr lang="en-US"/>
           </a:p>
@@ -2507,7 +2507,7 @@
           <a:p>
             <a:fld id="{CD851AF9-628A-D441-9A3F-0E66B844A3C7}" type="datetimeFigureOut">
               <a:rPr lang="en-US" smtClean="0"/>
-              <a:t>11/4/14</a:t>
+              <a:t>11/12/14</a:t>
             </a:fld>
             <a:endParaRPr lang="en-US"/>
           </a:p>
@@ -2720,7 +2720,7 @@
           <a:p>
             <a:fld id="{CD851AF9-628A-D441-9A3F-0E66B844A3C7}" type="datetimeFigureOut">
               <a:rPr lang="en-US" smtClean="0"/>
-              <a:t>11/4/14</a:t>
+              <a:t>11/12/14</a:t>
             </a:fld>
             <a:endParaRPr lang="en-US"/>
           </a:p>
@@ -4267,6 +4267,234 @@
               <a:latin typeface="Bookman Old Style"/>
               <a:cs typeface="Bookman Old Style"/>
             </a:endParaRPr>
+          </a:p>
+        </p:txBody>
+      </p:sp>
+      <p:sp>
+        <p:nvSpPr>
+          <p:cNvPr id="11" name="Title 1"/>
+          <p:cNvSpPr txBox="1">
+            <a:spLocks/>
+          </p:cNvSpPr>
+          <p:nvPr/>
+        </p:nvSpPr>
+        <p:spPr>
+          <a:xfrm>
+            <a:off x="3779855" y="152400"/>
+            <a:ext cx="1828800" cy="914400"/>
+          </a:xfrm>
+          <a:prstGeom prst="rect">
+            <a:avLst/>
+          </a:prstGeom>
+        </p:spPr>
+        <p:style>
+          <a:lnRef idx="1">
+            <a:schemeClr val="accent1"/>
+          </a:lnRef>
+          <a:fillRef idx="2">
+            <a:schemeClr val="accent1"/>
+          </a:fillRef>
+          <a:effectRef idx="1">
+            <a:schemeClr val="accent1"/>
+          </a:effectRef>
+          <a:fontRef idx="minor">
+            <a:schemeClr val="dk1"/>
+          </a:fontRef>
+        </p:style>
+        <p:txBody>
+          <a:bodyPr vert="horz" lIns="91440" tIns="45720" rIns="91440" bIns="45720" rtlCol="0" anchor="ctr">
+            <a:normAutofit/>
+            <a:scene3d>
+              <a:camera prst="orthographicFront"/>
+              <a:lightRig rig="soft" dir="tl">
+                <a:rot lat="0" lon="0" rev="0"/>
+              </a:lightRig>
+            </a:scene3d>
+            <a:sp3d contourW="25400" prstMaterial="matte">
+              <a:bevelT w="25400" h="55880" prst="artDeco"/>
+              <a:contourClr>
+                <a:schemeClr val="accent2">
+                  <a:tint val="20000"/>
+                </a:schemeClr>
+              </a:contourClr>
+            </a:sp3d>
+          </a:bodyPr>
+          <a:lstStyle>
+            <a:lvl1pPr algn="ctr" defTabSz="457200" rtl="0" eaLnBrk="1" latinLnBrk="0" hangingPunct="1">
+              <a:spcBef>
+                <a:spcPct val="0"/>
+              </a:spcBef>
+              <a:buNone/>
+              <a:defRPr sz="4400" kern="1200">
+                <a:solidFill>
+                  <a:schemeClr val="tx1"/>
+                </a:solidFill>
+                <a:latin typeface="+mj-lt"/>
+                <a:ea typeface="+mj-ea"/>
+                <a:cs typeface="+mj-cs"/>
+              </a:defRPr>
+            </a:lvl1pPr>
+          </a:lstStyle>
+          <a:p>
+            <a:r>
+              <a:rPr lang="en-US" sz="4000" b="1" i="1" spc="50" dirty="0" smtClean="0">
+                <a:ln w="11430"/>
+                <a:gradFill>
+                  <a:gsLst>
+                    <a:gs pos="25000">
+                      <a:schemeClr val="accent2">
+                        <a:satMod val="155000"/>
+                      </a:schemeClr>
+                    </a:gs>
+                    <a:gs pos="100000">
+                      <a:schemeClr val="accent2">
+                        <a:shade val="45000"/>
+                        <a:satMod val="165000"/>
+                      </a:schemeClr>
+                    </a:gs>
+                  </a:gsLst>
+                  <a:lin ang="5400000"/>
+                </a:gradFill>
+                <a:effectLst>
+                  <a:outerShdw blurRad="76200" dist="50800" dir="5400000" algn="tl" rotWithShape="0">
+                    <a:srgbClr val="000000">
+                      <a:alpha val="65000"/>
+                    </a:srgbClr>
+                  </a:outerShdw>
+                </a:effectLst>
+                <a:latin typeface="Arial"/>
+                <a:cs typeface="Arial"/>
+              </a:rPr>
+              <a:t>P</a:t>
+            </a:r>
+            <a:r>
+              <a:rPr lang="en-US" sz="2400" b="1" i="1" spc="50" dirty="0" smtClean="0">
+                <a:ln w="11430"/>
+                <a:gradFill>
+                  <a:gsLst>
+                    <a:gs pos="25000">
+                      <a:schemeClr val="accent2">
+                        <a:satMod val="155000"/>
+                      </a:schemeClr>
+                    </a:gs>
+                    <a:gs pos="100000">
+                      <a:schemeClr val="accent2">
+                        <a:shade val="45000"/>
+                        <a:satMod val="165000"/>
+                      </a:schemeClr>
+                    </a:gs>
+                  </a:gsLst>
+                  <a:lin ang="5400000"/>
+                </a:gradFill>
+                <a:effectLst>
+                  <a:outerShdw blurRad="76200" dist="50800" dir="5400000" algn="tl" rotWithShape="0">
+                    <a:srgbClr val="000000">
+                      <a:alpha val="65000"/>
+                    </a:srgbClr>
+                  </a:outerShdw>
+                </a:effectLst>
+                <a:latin typeface="Arial"/>
+                <a:cs typeface="Arial"/>
+              </a:rPr>
+              <a:t>repare</a:t>
+            </a:r>
+            <a:endParaRPr lang="en-US" sz="2400" b="1" i="1" spc="50" dirty="0">
+              <a:ln w="11430"/>
+              <a:gradFill>
+                <a:gsLst>
+                  <a:gs pos="25000">
+                    <a:schemeClr val="accent2">
+                      <a:satMod val="155000"/>
+                    </a:schemeClr>
+                  </a:gs>
+                  <a:gs pos="100000">
+                    <a:schemeClr val="accent2">
+                      <a:shade val="45000"/>
+                      <a:satMod val="165000"/>
+                    </a:schemeClr>
+                  </a:gs>
+                </a:gsLst>
+                <a:lin ang="5400000"/>
+              </a:gradFill>
+              <a:effectLst>
+                <a:outerShdw blurRad="76200" dist="50800" dir="5400000" algn="tl" rotWithShape="0">
+                  <a:srgbClr val="000000">
+                    <a:alpha val="65000"/>
+                  </a:srgbClr>
+                </a:outerShdw>
+              </a:effectLst>
+              <a:latin typeface="Arial"/>
+              <a:cs typeface="Arial"/>
+            </a:endParaRPr>
+          </a:p>
+        </p:txBody>
+      </p:sp>
+      <p:sp>
+        <p:nvSpPr>
+          <p:cNvPr id="3" name="Rounded Rectangle 2"/>
+          <p:cNvSpPr/>
+          <p:nvPr/>
+        </p:nvSpPr>
+        <p:spPr>
+          <a:xfrm>
+            <a:off x="6147712" y="303036"/>
+            <a:ext cx="1861631" cy="763764"/>
+          </a:xfrm>
+          <a:prstGeom prst="roundRect">
+            <a:avLst/>
+          </a:prstGeom>
+        </p:spPr>
+        <p:style>
+          <a:lnRef idx="1">
+            <a:schemeClr val="accent1"/>
+          </a:lnRef>
+          <a:fillRef idx="2">
+            <a:schemeClr val="accent1"/>
+          </a:fillRef>
+          <a:effectRef idx="1">
+            <a:schemeClr val="accent1"/>
+          </a:effectRef>
+          <a:fontRef idx="minor">
+            <a:schemeClr val="dk1"/>
+          </a:fontRef>
+        </p:style>
+        <p:txBody>
+          <a:bodyPr rtlCol="0" anchor="ctr"/>
+          <a:lstStyle/>
+          <a:p>
+            <a:pPr algn="ctr"/>
+            <a:r>
+              <a:rPr lang="en-US" sz="3200" b="1" i="1" spc="50" dirty="0">
+                <a:ln w="11430"/>
+                <a:gradFill>
+                  <a:gsLst>
+                    <a:gs pos="25000">
+                      <a:schemeClr val="accent2">
+                        <a:satMod val="155000"/>
+                      </a:schemeClr>
+                    </a:gs>
+                    <a:gs pos="100000">
+                      <a:schemeClr val="accent2">
+                        <a:shade val="45000"/>
+                        <a:satMod val="165000"/>
+                      </a:schemeClr>
+                    </a:gs>
+                  </a:gsLst>
+                  <a:lin ang="5400000"/>
+                </a:gradFill>
+                <a:effectLst>
+                  <a:outerShdw blurRad="76200" dist="50800" dir="5400000" algn="tl" rotWithShape="0">
+                    <a:srgbClr val="000000">
+                      <a:alpha val="65000"/>
+                    </a:srgbClr>
+                  </a:outerShdw>
+                </a:effectLst>
+                <a:latin typeface="Arial"/>
+                <a:cs typeface="Arial"/>
+              </a:rPr>
+              <a:t>Prepare</a:t>
+            </a:r>
+            <a:endParaRPr lang="en-US" sz="3200" dirty="0"/>
           </a:p>
         </p:txBody>
       </p:sp>

</xml_diff>

<commit_message>
PCA plotting function has been added.
</commit_message>
<xml_diff>
--- a/images/icons.pptx
+++ b/images/icons.pptx
@@ -6,6 +6,7 @@
   </p:sldMasterIdLst>
   <p:sldIdLst>
     <p:sldId id="256" r:id="rId2"/>
+    <p:sldId id="257" r:id="rId3"/>
   </p:sldIdLst>
   <p:sldSz cx="9144000" cy="6858000" type="screen4x3"/>
   <p:notesSz cx="6858000" cy="9144000"/>
@@ -288,7 +289,7 @@
           <a:p>
             <a:fld id="{CD851AF9-628A-D441-9A3F-0E66B844A3C7}" type="datetimeFigureOut">
               <a:rPr lang="en-US" smtClean="0"/>
-              <a:t>11/12/14</a:t>
+              <a:t>1/20/15</a:t>
             </a:fld>
             <a:endParaRPr lang="en-US"/>
           </a:p>
@@ -458,7 +459,7 @@
           <a:p>
             <a:fld id="{CD851AF9-628A-D441-9A3F-0E66B844A3C7}" type="datetimeFigureOut">
               <a:rPr lang="en-US" smtClean="0"/>
-              <a:t>11/12/14</a:t>
+              <a:t>1/20/15</a:t>
             </a:fld>
             <a:endParaRPr lang="en-US"/>
           </a:p>
@@ -638,7 +639,7 @@
           <a:p>
             <a:fld id="{CD851AF9-628A-D441-9A3F-0E66B844A3C7}" type="datetimeFigureOut">
               <a:rPr lang="en-US" smtClean="0"/>
-              <a:t>11/12/14</a:t>
+              <a:t>1/20/15</a:t>
             </a:fld>
             <a:endParaRPr lang="en-US"/>
           </a:p>
@@ -808,7 +809,7 @@
           <a:p>
             <a:fld id="{CD851AF9-628A-D441-9A3F-0E66B844A3C7}" type="datetimeFigureOut">
               <a:rPr lang="en-US" smtClean="0"/>
-              <a:t>11/12/14</a:t>
+              <a:t>1/20/15</a:t>
             </a:fld>
             <a:endParaRPr lang="en-US"/>
           </a:p>
@@ -1054,7 +1055,7 @@
           <a:p>
             <a:fld id="{CD851AF9-628A-D441-9A3F-0E66B844A3C7}" type="datetimeFigureOut">
               <a:rPr lang="en-US" smtClean="0"/>
-              <a:t>11/12/14</a:t>
+              <a:t>1/20/15</a:t>
             </a:fld>
             <a:endParaRPr lang="en-US"/>
           </a:p>
@@ -1342,7 +1343,7 @@
           <a:p>
             <a:fld id="{CD851AF9-628A-D441-9A3F-0E66B844A3C7}" type="datetimeFigureOut">
               <a:rPr lang="en-US" smtClean="0"/>
-              <a:t>11/12/14</a:t>
+              <a:t>1/20/15</a:t>
             </a:fld>
             <a:endParaRPr lang="en-US"/>
           </a:p>
@@ -1764,7 +1765,7 @@
           <a:p>
             <a:fld id="{CD851AF9-628A-D441-9A3F-0E66B844A3C7}" type="datetimeFigureOut">
               <a:rPr lang="en-US" smtClean="0"/>
-              <a:t>11/12/14</a:t>
+              <a:t>1/20/15</a:t>
             </a:fld>
             <a:endParaRPr lang="en-US"/>
           </a:p>
@@ -1882,7 +1883,7 @@
           <a:p>
             <a:fld id="{CD851AF9-628A-D441-9A3F-0E66B844A3C7}" type="datetimeFigureOut">
               <a:rPr lang="en-US" smtClean="0"/>
-              <a:t>11/12/14</a:t>
+              <a:t>1/20/15</a:t>
             </a:fld>
             <a:endParaRPr lang="en-US"/>
           </a:p>
@@ -1977,7 +1978,7 @@
           <a:p>
             <a:fld id="{CD851AF9-628A-D441-9A3F-0E66B844A3C7}" type="datetimeFigureOut">
               <a:rPr lang="en-US" smtClean="0"/>
-              <a:t>11/12/14</a:t>
+              <a:t>1/20/15</a:t>
             </a:fld>
             <a:endParaRPr lang="en-US"/>
           </a:p>
@@ -2254,7 +2255,7 @@
           <a:p>
             <a:fld id="{CD851AF9-628A-D441-9A3F-0E66B844A3C7}" type="datetimeFigureOut">
               <a:rPr lang="en-US" smtClean="0"/>
-              <a:t>11/12/14</a:t>
+              <a:t>1/20/15</a:t>
             </a:fld>
             <a:endParaRPr lang="en-US"/>
           </a:p>
@@ -2507,7 +2508,7 @@
           <a:p>
             <a:fld id="{CD851AF9-628A-D441-9A3F-0E66B844A3C7}" type="datetimeFigureOut">
               <a:rPr lang="en-US" smtClean="0"/>
-              <a:t>11/12/14</a:t>
+              <a:t>1/20/15</a:t>
             </a:fld>
             <a:endParaRPr lang="en-US"/>
           </a:p>
@@ -2720,7 +2721,7 @@
           <a:p>
             <a:fld id="{CD851AF9-628A-D441-9A3F-0E66B844A3C7}" type="datetimeFigureOut">
               <a:rPr lang="en-US" smtClean="0"/>
-              <a:t>11/12/14</a:t>
+              <a:t>1/20/15</a:t>
             </a:fld>
             <a:endParaRPr lang="en-US"/>
           </a:p>
@@ -4502,6 +4503,1702 @@
     <p:extLst>
       <p:ext uri="{BB962C8B-B14F-4D97-AF65-F5344CB8AC3E}">
         <p14:creationId xmlns:p14="http://schemas.microsoft.com/office/powerpoint/2010/main" val="3400061729"/>
+      </p:ext>
+    </p:extLst>
+  </p:cSld>
+  <p:clrMapOvr>
+    <a:masterClrMapping/>
+  </p:clrMapOvr>
+</p:sld>
+</file>
+
+<file path=ppt/slides/slide2.xml><?xml version="1.0" encoding="utf-8"?>
+<p:sld xmlns:a="http://schemas.openxmlformats.org/drawingml/2006/main" xmlns:r="http://schemas.openxmlformats.org/officeDocument/2006/relationships" xmlns:p="http://schemas.openxmlformats.org/presentationml/2006/main">
+  <p:cSld>
+    <p:spTree>
+      <p:nvGrpSpPr>
+        <p:cNvPr id="1" name=""/>
+        <p:cNvGrpSpPr/>
+        <p:nvPr/>
+      </p:nvGrpSpPr>
+      <p:grpSpPr>
+        <a:xfrm>
+          <a:off x="0" y="0"/>
+          <a:ext cx="0" cy="0"/>
+          <a:chOff x="0" y="0"/>
+          <a:chExt cx="0" cy="0"/>
+        </a:xfrm>
+      </p:grpSpPr>
+      <p:grpSp>
+        <p:nvGrpSpPr>
+          <p:cNvPr id="60" name="Group 59"/>
+          <p:cNvGrpSpPr/>
+          <p:nvPr/>
+        </p:nvGrpSpPr>
+        <p:grpSpPr>
+          <a:xfrm>
+            <a:off x="860244" y="2190268"/>
+            <a:ext cx="971164" cy="1406762"/>
+            <a:chOff x="242902" y="2234933"/>
+            <a:chExt cx="1122134" cy="1431353"/>
+          </a:xfrm>
+        </p:grpSpPr>
+        <p:grpSp>
+          <p:nvGrpSpPr>
+            <p:cNvPr id="26" name="Group 25"/>
+            <p:cNvGrpSpPr>
+              <a:grpSpLocks noChangeAspect="1"/>
+            </p:cNvGrpSpPr>
+            <p:nvPr/>
+          </p:nvGrpSpPr>
+          <p:grpSpPr>
+            <a:xfrm>
+              <a:off x="515937" y="2234933"/>
+              <a:ext cx="464495" cy="797912"/>
+              <a:chOff x="1789475" y="1248171"/>
+              <a:chExt cx="995756" cy="1602697"/>
+            </a:xfrm>
+          </p:grpSpPr>
+          <p:sp>
+            <p:nvSpPr>
+              <p:cNvPr id="5" name="Snip and Round Single Corner Rectangle 4"/>
+              <p:cNvSpPr>
+                <a:spLocks noChangeAspect="1"/>
+              </p:cNvSpPr>
+              <p:nvPr/>
+            </p:nvSpPr>
+            <p:spPr>
+              <a:xfrm rot="17872948">
+                <a:off x="1847201" y="1854293"/>
+                <a:ext cx="1486419" cy="274176"/>
+              </a:xfrm>
+              <a:prstGeom prst="snipRoundRect">
+                <a:avLst/>
+              </a:prstGeom>
+            </p:spPr>
+            <p:style>
+              <a:lnRef idx="2">
+                <a:schemeClr val="dk1"/>
+              </a:lnRef>
+              <a:fillRef idx="1">
+                <a:schemeClr val="lt1"/>
+              </a:fillRef>
+              <a:effectRef idx="0">
+                <a:schemeClr val="dk1"/>
+              </a:effectRef>
+              <a:fontRef idx="minor">
+                <a:schemeClr val="dk1"/>
+              </a:fontRef>
+            </p:style>
+            <p:txBody>
+              <a:bodyPr rtlCol="0" anchor="ctr"/>
+              <a:lstStyle/>
+              <a:p>
+                <a:pPr algn="ctr"/>
+                <a:endParaRPr lang="en-US"/>
+              </a:p>
+            </p:txBody>
+          </p:sp>
+          <p:sp>
+            <p:nvSpPr>
+              <p:cNvPr id="4" name="Round Same Side Corner Rectangle 3"/>
+              <p:cNvSpPr>
+                <a:spLocks noChangeAspect="1"/>
+              </p:cNvSpPr>
+              <p:nvPr/>
+            </p:nvSpPr>
+            <p:spPr>
+              <a:xfrm rot="10800000">
+                <a:off x="1789475" y="1985050"/>
+                <a:ext cx="995756" cy="865818"/>
+              </a:xfrm>
+              <a:prstGeom prst="round2SameRect">
+                <a:avLst>
+                  <a:gd name="adj1" fmla="val 50000"/>
+                  <a:gd name="adj2" fmla="val 0"/>
+                </a:avLst>
+              </a:prstGeom>
+            </p:spPr>
+            <p:style>
+              <a:lnRef idx="2">
+                <a:schemeClr val="dk1"/>
+              </a:lnRef>
+              <a:fillRef idx="1">
+                <a:schemeClr val="lt1"/>
+              </a:fillRef>
+              <a:effectRef idx="0">
+                <a:schemeClr val="dk1"/>
+              </a:effectRef>
+              <a:fontRef idx="minor">
+                <a:schemeClr val="dk1"/>
+              </a:fontRef>
+            </p:style>
+            <p:txBody>
+              <a:bodyPr rtlCol="0" anchor="ctr"/>
+              <a:lstStyle/>
+              <a:p>
+                <a:pPr algn="ctr"/>
+                <a:endParaRPr lang="en-US"/>
+              </a:p>
+            </p:txBody>
+          </p:sp>
+        </p:grpSp>
+        <p:sp>
+          <p:nvSpPr>
+            <p:cNvPr id="55" name="TextBox 54"/>
+            <p:cNvSpPr txBox="1"/>
+            <p:nvPr/>
+          </p:nvSpPr>
+          <p:spPr>
+            <a:xfrm>
+              <a:off x="242902" y="3290498"/>
+              <a:ext cx="1122134" cy="375788"/>
+            </a:xfrm>
+            <a:prstGeom prst="rect">
+              <a:avLst/>
+            </a:prstGeom>
+            <a:noFill/>
+          </p:spPr>
+          <p:txBody>
+            <a:bodyPr wrap="none" rtlCol="0">
+              <a:spAutoFit/>
+            </a:bodyPr>
+            <a:lstStyle/>
+            <a:p>
+              <a:r>
+                <a:rPr lang="en-US" b="1" dirty="0" smtClean="0">
+                  <a:latin typeface="Times"/>
+                  <a:cs typeface="Times"/>
+                </a:rPr>
+                <a:t>Prepare</a:t>
+              </a:r>
+              <a:endParaRPr lang="en-US" b="1" dirty="0">
+                <a:latin typeface="Times"/>
+                <a:cs typeface="Times"/>
+              </a:endParaRPr>
+            </a:p>
+          </p:txBody>
+        </p:sp>
+      </p:grpSp>
+      <p:grpSp>
+        <p:nvGrpSpPr>
+          <p:cNvPr id="61" name="Group 60"/>
+          <p:cNvGrpSpPr/>
+          <p:nvPr/>
+        </p:nvGrpSpPr>
+        <p:grpSpPr>
+          <a:xfrm>
+            <a:off x="2240324" y="1880335"/>
+            <a:ext cx="1302260" cy="1700627"/>
+            <a:chOff x="2904150" y="1880335"/>
+            <a:chExt cx="1302260" cy="1700627"/>
+          </a:xfrm>
+        </p:grpSpPr>
+        <p:grpSp>
+          <p:nvGrpSpPr>
+            <p:cNvPr id="54" name="Group 53"/>
+            <p:cNvGrpSpPr/>
+            <p:nvPr/>
+          </p:nvGrpSpPr>
+          <p:grpSpPr>
+            <a:xfrm>
+              <a:off x="2904150" y="1880335"/>
+              <a:ext cx="1302260" cy="994988"/>
+              <a:chOff x="2904150" y="1880335"/>
+              <a:chExt cx="1302260" cy="994988"/>
+            </a:xfrm>
+          </p:grpSpPr>
+          <p:sp>
+            <p:nvSpPr>
+              <p:cNvPr id="40" name="Round Same Side Corner Rectangle 39"/>
+              <p:cNvSpPr/>
+              <p:nvPr/>
+            </p:nvSpPr>
+            <p:spPr>
+              <a:xfrm rot="10800000">
+                <a:off x="2904150" y="2528996"/>
+                <a:ext cx="995756" cy="346327"/>
+              </a:xfrm>
+              <a:prstGeom prst="round2SameRect">
+                <a:avLst>
+                  <a:gd name="adj1" fmla="val 50000"/>
+                  <a:gd name="adj2" fmla="val 0"/>
+                </a:avLst>
+              </a:prstGeom>
+              <a:noFill/>
+              <a:scene3d>
+                <a:camera prst="orthographicFront"/>
+                <a:lightRig rig="threePt" dir="t"/>
+              </a:scene3d>
+              <a:sp3d>
+                <a:bevelT w="139700" prst="cross"/>
+              </a:sp3d>
+            </p:spPr>
+            <p:style>
+              <a:lnRef idx="2">
+                <a:schemeClr val="dk1"/>
+              </a:lnRef>
+              <a:fillRef idx="1">
+                <a:schemeClr val="lt1"/>
+              </a:fillRef>
+              <a:effectRef idx="0">
+                <a:schemeClr val="dk1"/>
+              </a:effectRef>
+              <a:fontRef idx="minor">
+                <a:schemeClr val="dk1"/>
+              </a:fontRef>
+            </p:style>
+            <p:txBody>
+              <a:bodyPr rtlCol="0" anchor="ctr"/>
+              <a:lstStyle/>
+              <a:p>
+                <a:pPr algn="ctr"/>
+                <a:endParaRPr lang="en-US"/>
+              </a:p>
+            </p:txBody>
+          </p:sp>
+          <p:grpSp>
+            <p:nvGrpSpPr>
+              <p:cNvPr id="49" name="Group 48"/>
+              <p:cNvGrpSpPr/>
+              <p:nvPr/>
+            </p:nvGrpSpPr>
+            <p:grpSpPr>
+              <a:xfrm rot="17157812">
+                <a:off x="3595538" y="1878199"/>
+                <a:ext cx="608735" cy="613008"/>
+                <a:chOff x="3621610" y="937347"/>
+                <a:chExt cx="608735" cy="613008"/>
+              </a:xfrm>
+            </p:grpSpPr>
+            <p:sp>
+              <p:nvSpPr>
+                <p:cNvPr id="47" name="Can 46"/>
+                <p:cNvSpPr/>
+                <p:nvPr/>
+              </p:nvSpPr>
+              <p:spPr>
+                <a:xfrm>
+                  <a:off x="3747549" y="937968"/>
+                  <a:ext cx="385791" cy="606073"/>
+                </a:xfrm>
+                <a:prstGeom prst="can">
+                  <a:avLst/>
+                </a:prstGeom>
+                <a:noFill/>
+              </p:spPr>
+              <p:style>
+                <a:lnRef idx="2">
+                  <a:schemeClr val="dk1"/>
+                </a:lnRef>
+                <a:fillRef idx="1">
+                  <a:schemeClr val="lt1"/>
+                </a:fillRef>
+                <a:effectRef idx="0">
+                  <a:schemeClr val="dk1"/>
+                </a:effectRef>
+                <a:fontRef idx="minor">
+                  <a:schemeClr val="dk1"/>
+                </a:fontRef>
+              </p:style>
+              <p:txBody>
+                <a:bodyPr rtlCol="0" anchor="ctr"/>
+                <a:lstStyle/>
+                <a:p>
+                  <a:pPr algn="ctr"/>
+                  <a:endParaRPr lang="en-US"/>
+                </a:p>
+              </p:txBody>
+            </p:sp>
+            <p:sp>
+              <p:nvSpPr>
+                <p:cNvPr id="48" name="Arc 47"/>
+                <p:cNvSpPr/>
+                <p:nvPr/>
+              </p:nvSpPr>
+              <p:spPr>
+                <a:xfrm rot="2763515">
+                  <a:off x="3619474" y="939483"/>
+                  <a:ext cx="613008" cy="608735"/>
+                </a:xfrm>
+                <a:prstGeom prst="arc">
+                  <a:avLst/>
+                </a:prstGeom>
+              </p:spPr>
+              <p:style>
+                <a:lnRef idx="2">
+                  <a:schemeClr val="dk1"/>
+                </a:lnRef>
+                <a:fillRef idx="0">
+                  <a:schemeClr val="dk1"/>
+                </a:fillRef>
+                <a:effectRef idx="1">
+                  <a:schemeClr val="dk1"/>
+                </a:effectRef>
+                <a:fontRef idx="minor">
+                  <a:schemeClr val="tx1"/>
+                </a:fontRef>
+              </p:style>
+              <p:txBody>
+                <a:bodyPr rtlCol="0" anchor="ctr"/>
+                <a:lstStyle/>
+                <a:p>
+                  <a:pPr algn="ctr"/>
+                  <a:endParaRPr lang="en-US"/>
+                </a:p>
+              </p:txBody>
+            </p:sp>
+          </p:grpSp>
+          <p:sp>
+            <p:nvSpPr>
+              <p:cNvPr id="50" name="Arc 49"/>
+              <p:cNvSpPr/>
+              <p:nvPr/>
+            </p:nvSpPr>
+            <p:spPr>
+              <a:xfrm rot="14802455">
+                <a:off x="3510871" y="1990840"/>
+                <a:ext cx="502460" cy="809973"/>
+              </a:xfrm>
+              <a:prstGeom prst="arc">
+                <a:avLst>
+                  <a:gd name="adj1" fmla="val 16766280"/>
+                  <a:gd name="adj2" fmla="val 0"/>
+                </a:avLst>
+              </a:prstGeom>
+            </p:spPr>
+            <p:style>
+              <a:lnRef idx="2">
+                <a:schemeClr val="accent1"/>
+              </a:lnRef>
+              <a:fillRef idx="0">
+                <a:schemeClr val="accent1"/>
+              </a:fillRef>
+              <a:effectRef idx="1">
+                <a:schemeClr val="accent1"/>
+              </a:effectRef>
+              <a:fontRef idx="minor">
+                <a:schemeClr val="tx1"/>
+              </a:fontRef>
+            </p:style>
+            <p:txBody>
+              <a:bodyPr rtlCol="0" anchor="ctr"/>
+              <a:lstStyle/>
+              <a:p>
+                <a:pPr algn="ctr"/>
+                <a:endParaRPr lang="en-US"/>
+              </a:p>
+            </p:txBody>
+          </p:sp>
+          <p:sp>
+            <p:nvSpPr>
+              <p:cNvPr id="51" name="Arc 50"/>
+              <p:cNvSpPr/>
+              <p:nvPr/>
+            </p:nvSpPr>
+            <p:spPr>
+              <a:xfrm rot="14802455">
+                <a:off x="3533392" y="2027800"/>
+                <a:ext cx="502460" cy="809973"/>
+              </a:xfrm>
+              <a:prstGeom prst="arc">
+                <a:avLst>
+                  <a:gd name="adj1" fmla="val 16766280"/>
+                  <a:gd name="adj2" fmla="val 0"/>
+                </a:avLst>
+              </a:prstGeom>
+              <a:ln>
+                <a:solidFill>
+                  <a:srgbClr val="7F7F7F"/>
+                </a:solidFill>
+              </a:ln>
+            </p:spPr>
+            <p:style>
+              <a:lnRef idx="2">
+                <a:schemeClr val="accent1"/>
+              </a:lnRef>
+              <a:fillRef idx="0">
+                <a:schemeClr val="accent1"/>
+              </a:fillRef>
+              <a:effectRef idx="1">
+                <a:schemeClr val="accent1"/>
+              </a:effectRef>
+              <a:fontRef idx="minor">
+                <a:schemeClr val="tx1"/>
+              </a:fontRef>
+            </p:style>
+            <p:txBody>
+              <a:bodyPr rtlCol="0" anchor="ctr"/>
+              <a:lstStyle/>
+              <a:p>
+                <a:pPr algn="ctr"/>
+                <a:endParaRPr lang="en-US"/>
+              </a:p>
+            </p:txBody>
+          </p:sp>
+          <p:sp>
+            <p:nvSpPr>
+              <p:cNvPr id="52" name="Arc 51"/>
+              <p:cNvSpPr/>
+              <p:nvPr/>
+            </p:nvSpPr>
+            <p:spPr>
+              <a:xfrm rot="14802455">
+                <a:off x="3496681" y="2006242"/>
+                <a:ext cx="527810" cy="824185"/>
+              </a:xfrm>
+              <a:prstGeom prst="arc">
+                <a:avLst>
+                  <a:gd name="adj1" fmla="val 16766280"/>
+                  <a:gd name="adj2" fmla="val 0"/>
+                </a:avLst>
+              </a:prstGeom>
+              <a:ln>
+                <a:solidFill>
+                  <a:srgbClr val="7F7F7F"/>
+                </a:solidFill>
+              </a:ln>
+            </p:spPr>
+            <p:style>
+              <a:lnRef idx="2">
+                <a:schemeClr val="dk1"/>
+              </a:lnRef>
+              <a:fillRef idx="0">
+                <a:schemeClr val="dk1"/>
+              </a:fillRef>
+              <a:effectRef idx="1">
+                <a:schemeClr val="dk1"/>
+              </a:effectRef>
+              <a:fontRef idx="minor">
+                <a:schemeClr val="tx1"/>
+              </a:fontRef>
+            </p:style>
+            <p:txBody>
+              <a:bodyPr rtlCol="0" anchor="ctr"/>
+              <a:lstStyle/>
+              <a:p>
+                <a:pPr algn="ctr"/>
+                <a:endParaRPr lang="en-US"/>
+              </a:p>
+            </p:txBody>
+          </p:sp>
+        </p:grpSp>
+        <p:sp>
+          <p:nvSpPr>
+            <p:cNvPr id="56" name="TextBox 55"/>
+            <p:cNvSpPr txBox="1"/>
+            <p:nvPr/>
+          </p:nvSpPr>
+          <p:spPr>
+            <a:xfrm>
+              <a:off x="2961873" y="3211630"/>
+              <a:ext cx="902749" cy="369332"/>
+            </a:xfrm>
+            <a:prstGeom prst="rect">
+              <a:avLst/>
+            </a:prstGeom>
+            <a:noFill/>
+          </p:spPr>
+          <p:txBody>
+            <a:bodyPr wrap="none" rtlCol="0">
+              <a:spAutoFit/>
+            </a:bodyPr>
+            <a:lstStyle/>
+            <a:p>
+              <a:r>
+                <a:rPr lang="en-US" b="1" dirty="0" smtClean="0">
+                  <a:latin typeface="Times"/>
+                  <a:cs typeface="Times"/>
+                </a:rPr>
+                <a:t>Solvate</a:t>
+              </a:r>
+              <a:endParaRPr lang="en-US" b="1" dirty="0">
+                <a:latin typeface="Times"/>
+                <a:cs typeface="Times"/>
+              </a:endParaRPr>
+            </a:p>
+          </p:txBody>
+        </p:sp>
+      </p:grpSp>
+      <p:grpSp>
+        <p:nvGrpSpPr>
+          <p:cNvPr id="62" name="Group 61"/>
+          <p:cNvGrpSpPr/>
+          <p:nvPr/>
+        </p:nvGrpSpPr>
+        <p:grpSpPr>
+          <a:xfrm>
+            <a:off x="4627815" y="1882746"/>
+            <a:ext cx="1207309" cy="1702253"/>
+            <a:chOff x="4627815" y="1882746"/>
+            <a:chExt cx="1207309" cy="1702253"/>
+          </a:xfrm>
+        </p:grpSpPr>
+        <p:grpSp>
+          <p:nvGrpSpPr>
+            <p:cNvPr id="35" name="Group 34"/>
+            <p:cNvGrpSpPr/>
+            <p:nvPr/>
+          </p:nvGrpSpPr>
+          <p:grpSpPr>
+            <a:xfrm>
+              <a:off x="4627815" y="1882746"/>
+              <a:ext cx="1207309" cy="998753"/>
+              <a:chOff x="1828168" y="1911605"/>
+              <a:chExt cx="1207309" cy="998753"/>
+            </a:xfrm>
+          </p:grpSpPr>
+          <p:sp>
+            <p:nvSpPr>
+              <p:cNvPr id="27" name="Round Same Side Corner Rectangle 26"/>
+              <p:cNvSpPr/>
+              <p:nvPr/>
+            </p:nvSpPr>
+            <p:spPr>
+              <a:xfrm rot="10800000">
+                <a:off x="1828168" y="2564031"/>
+                <a:ext cx="995756" cy="346327"/>
+              </a:xfrm>
+              <a:prstGeom prst="round2SameRect">
+                <a:avLst>
+                  <a:gd name="adj1" fmla="val 50000"/>
+                  <a:gd name="adj2" fmla="val 0"/>
+                </a:avLst>
+              </a:prstGeom>
+              <a:scene3d>
+                <a:camera prst="orthographicFront"/>
+                <a:lightRig rig="threePt" dir="t"/>
+              </a:scene3d>
+              <a:sp3d>
+                <a:bevelT w="139700" prst="cross"/>
+              </a:sp3d>
+            </p:spPr>
+            <p:style>
+              <a:lnRef idx="2">
+                <a:schemeClr val="dk1"/>
+              </a:lnRef>
+              <a:fillRef idx="1">
+                <a:schemeClr val="lt1"/>
+              </a:fillRef>
+              <a:effectRef idx="0">
+                <a:schemeClr val="dk1"/>
+              </a:effectRef>
+              <a:fontRef idx="minor">
+                <a:schemeClr val="dk1"/>
+              </a:fontRef>
+            </p:style>
+            <p:txBody>
+              <a:bodyPr rtlCol="0" anchor="ctr"/>
+              <a:lstStyle/>
+              <a:p>
+                <a:pPr algn="ctr"/>
+                <a:endParaRPr lang="en-US"/>
+              </a:p>
+            </p:txBody>
+          </p:sp>
+          <p:sp>
+            <p:nvSpPr>
+              <p:cNvPr id="28" name="Cube 27"/>
+              <p:cNvSpPr/>
+              <p:nvPr/>
+            </p:nvSpPr>
+            <p:spPr>
+              <a:xfrm rot="19570074">
+                <a:off x="2612370" y="1911605"/>
+                <a:ext cx="423107" cy="207282"/>
+              </a:xfrm>
+              <a:prstGeom prst="cube">
+                <a:avLst/>
+              </a:prstGeom>
+            </p:spPr>
+            <p:style>
+              <a:lnRef idx="2">
+                <a:schemeClr val="dk1"/>
+              </a:lnRef>
+              <a:fillRef idx="1">
+                <a:schemeClr val="lt1"/>
+              </a:fillRef>
+              <a:effectRef idx="0">
+                <a:schemeClr val="dk1"/>
+              </a:effectRef>
+              <a:fontRef idx="minor">
+                <a:schemeClr val="dk1"/>
+              </a:fontRef>
+            </p:style>
+            <p:txBody>
+              <a:bodyPr rtlCol="0" anchor="ctr"/>
+              <a:lstStyle/>
+              <a:p>
+                <a:pPr algn="ctr"/>
+                <a:endParaRPr lang="en-US"/>
+              </a:p>
+            </p:txBody>
+          </p:sp>
+          <p:sp>
+            <p:nvSpPr>
+              <p:cNvPr id="29" name="Oval 28"/>
+              <p:cNvSpPr>
+                <a:spLocks noChangeAspect="1"/>
+              </p:cNvSpPr>
+              <p:nvPr/>
+            </p:nvSpPr>
+            <p:spPr>
+              <a:xfrm>
+                <a:off x="2547792" y="2301102"/>
+                <a:ext cx="57962" cy="57370"/>
+              </a:xfrm>
+              <a:prstGeom prst="ellipse">
+                <a:avLst/>
+              </a:prstGeom>
+              <a:ln>
+                <a:solidFill>
+                  <a:srgbClr val="7F7F7F"/>
+                </a:solidFill>
+              </a:ln>
+            </p:spPr>
+            <p:style>
+              <a:lnRef idx="2">
+                <a:schemeClr val="dk1"/>
+              </a:lnRef>
+              <a:fillRef idx="1">
+                <a:schemeClr val="lt1"/>
+              </a:fillRef>
+              <a:effectRef idx="0">
+                <a:schemeClr val="dk1"/>
+              </a:effectRef>
+              <a:fontRef idx="minor">
+                <a:schemeClr val="dk1"/>
+              </a:fontRef>
+            </p:style>
+            <p:txBody>
+              <a:bodyPr rtlCol="0" anchor="ctr"/>
+              <a:lstStyle/>
+              <a:p>
+                <a:pPr algn="ctr"/>
+                <a:endParaRPr lang="en-US"/>
+              </a:p>
+            </p:txBody>
+          </p:sp>
+          <p:sp>
+            <p:nvSpPr>
+              <p:cNvPr id="31" name="Oval 30"/>
+              <p:cNvSpPr>
+                <a:spLocks noChangeAspect="1"/>
+              </p:cNvSpPr>
+              <p:nvPr/>
+            </p:nvSpPr>
+            <p:spPr>
+              <a:xfrm>
+                <a:off x="2613606" y="2453502"/>
+                <a:ext cx="57962" cy="57370"/>
+              </a:xfrm>
+              <a:prstGeom prst="ellipse">
+                <a:avLst/>
+              </a:prstGeom>
+              <a:ln>
+                <a:solidFill>
+                  <a:srgbClr val="7F7F7F"/>
+                </a:solidFill>
+              </a:ln>
+            </p:spPr>
+            <p:style>
+              <a:lnRef idx="2">
+                <a:schemeClr val="dk1"/>
+              </a:lnRef>
+              <a:fillRef idx="1">
+                <a:schemeClr val="lt1"/>
+              </a:fillRef>
+              <a:effectRef idx="0">
+                <a:schemeClr val="dk1"/>
+              </a:effectRef>
+              <a:fontRef idx="minor">
+                <a:schemeClr val="dk1"/>
+              </a:fontRef>
+            </p:style>
+            <p:txBody>
+              <a:bodyPr rtlCol="0" anchor="ctr"/>
+              <a:lstStyle/>
+              <a:p>
+                <a:pPr algn="ctr"/>
+                <a:endParaRPr lang="en-US"/>
+              </a:p>
+            </p:txBody>
+          </p:sp>
+          <p:sp>
+            <p:nvSpPr>
+              <p:cNvPr id="32" name="Oval 31"/>
+              <p:cNvSpPr>
+                <a:spLocks noChangeAspect="1"/>
+              </p:cNvSpPr>
+              <p:nvPr/>
+            </p:nvSpPr>
+            <p:spPr>
+              <a:xfrm>
+                <a:off x="2448524" y="2274012"/>
+                <a:ext cx="57962" cy="57370"/>
+              </a:xfrm>
+              <a:prstGeom prst="ellipse">
+                <a:avLst/>
+              </a:prstGeom>
+              <a:ln>
+                <a:solidFill>
+                  <a:srgbClr val="7F7F7F"/>
+                </a:solidFill>
+              </a:ln>
+            </p:spPr>
+            <p:style>
+              <a:lnRef idx="2">
+                <a:schemeClr val="dk1"/>
+              </a:lnRef>
+              <a:fillRef idx="1">
+                <a:schemeClr val="lt1"/>
+              </a:fillRef>
+              <a:effectRef idx="0">
+                <a:schemeClr val="dk1"/>
+              </a:effectRef>
+              <a:fontRef idx="minor">
+                <a:schemeClr val="dk1"/>
+              </a:fontRef>
+            </p:style>
+            <p:txBody>
+              <a:bodyPr rtlCol="0" anchor="ctr"/>
+              <a:lstStyle/>
+              <a:p>
+                <a:pPr algn="ctr"/>
+                <a:endParaRPr lang="en-US"/>
+              </a:p>
+            </p:txBody>
+          </p:sp>
+          <p:sp>
+            <p:nvSpPr>
+              <p:cNvPr id="33" name="Oval 32"/>
+              <p:cNvSpPr>
+                <a:spLocks noChangeAspect="1"/>
+              </p:cNvSpPr>
+              <p:nvPr/>
+            </p:nvSpPr>
+            <p:spPr>
+              <a:xfrm>
+                <a:off x="2491817" y="2403882"/>
+                <a:ext cx="57962" cy="57370"/>
+              </a:xfrm>
+              <a:prstGeom prst="ellipse">
+                <a:avLst/>
+              </a:prstGeom>
+              <a:ln>
+                <a:solidFill>
+                  <a:srgbClr val="7F7F7F"/>
+                </a:solidFill>
+              </a:ln>
+            </p:spPr>
+            <p:style>
+              <a:lnRef idx="2">
+                <a:schemeClr val="dk1"/>
+              </a:lnRef>
+              <a:fillRef idx="1">
+                <a:schemeClr val="lt1"/>
+              </a:fillRef>
+              <a:effectRef idx="0">
+                <a:schemeClr val="dk1"/>
+              </a:effectRef>
+              <a:fontRef idx="minor">
+                <a:schemeClr val="dk1"/>
+              </a:fontRef>
+            </p:style>
+            <p:txBody>
+              <a:bodyPr rtlCol="0" anchor="ctr"/>
+              <a:lstStyle/>
+              <a:p>
+                <a:pPr algn="ctr"/>
+                <a:endParaRPr lang="en-US"/>
+              </a:p>
+            </p:txBody>
+          </p:sp>
+          <p:sp>
+            <p:nvSpPr>
+              <p:cNvPr id="34" name="Oval 33"/>
+              <p:cNvSpPr>
+                <a:spLocks noChangeAspect="1"/>
+              </p:cNvSpPr>
+              <p:nvPr/>
+            </p:nvSpPr>
+            <p:spPr>
+              <a:xfrm>
+                <a:off x="2370028" y="2426412"/>
+                <a:ext cx="57962" cy="57370"/>
+              </a:xfrm>
+              <a:prstGeom prst="ellipse">
+                <a:avLst/>
+              </a:prstGeom>
+              <a:ln>
+                <a:solidFill>
+                  <a:srgbClr val="7F7F7F"/>
+                </a:solidFill>
+              </a:ln>
+            </p:spPr>
+            <p:style>
+              <a:lnRef idx="2">
+                <a:schemeClr val="dk1"/>
+              </a:lnRef>
+              <a:fillRef idx="1">
+                <a:schemeClr val="lt1"/>
+              </a:fillRef>
+              <a:effectRef idx="0">
+                <a:schemeClr val="dk1"/>
+              </a:effectRef>
+              <a:fontRef idx="minor">
+                <a:schemeClr val="dk1"/>
+              </a:fontRef>
+            </p:style>
+            <p:txBody>
+              <a:bodyPr rtlCol="0" anchor="ctr"/>
+              <a:lstStyle/>
+              <a:p>
+                <a:pPr algn="ctr"/>
+                <a:endParaRPr lang="en-US"/>
+              </a:p>
+            </p:txBody>
+          </p:sp>
+        </p:grpSp>
+        <p:sp>
+          <p:nvSpPr>
+            <p:cNvPr id="57" name="TextBox 56"/>
+            <p:cNvSpPr txBox="1"/>
+            <p:nvPr/>
+          </p:nvSpPr>
+          <p:spPr>
+            <a:xfrm>
+              <a:off x="4746733" y="3215667"/>
+              <a:ext cx="787332" cy="369332"/>
+            </a:xfrm>
+            <a:prstGeom prst="rect">
+              <a:avLst/>
+            </a:prstGeom>
+            <a:noFill/>
+          </p:spPr>
+          <p:txBody>
+            <a:bodyPr wrap="none" rtlCol="0">
+              <a:spAutoFit/>
+            </a:bodyPr>
+            <a:lstStyle/>
+            <a:p>
+              <a:r>
+                <a:rPr lang="en-US" b="1" dirty="0" smtClean="0">
+                  <a:latin typeface="Times"/>
+                  <a:cs typeface="Times"/>
+                </a:rPr>
+                <a:t>Ionize</a:t>
+              </a:r>
+              <a:endParaRPr lang="en-US" b="1" dirty="0">
+                <a:latin typeface="Times"/>
+                <a:cs typeface="Times"/>
+              </a:endParaRPr>
+            </a:p>
+          </p:txBody>
+        </p:sp>
+      </p:grpSp>
+      <p:grpSp>
+        <p:nvGrpSpPr>
+          <p:cNvPr id="63" name="Group 62"/>
+          <p:cNvGrpSpPr/>
+          <p:nvPr/>
+        </p:nvGrpSpPr>
+        <p:grpSpPr>
+          <a:xfrm>
+            <a:off x="5885506" y="2220503"/>
+            <a:ext cx="1638264" cy="1372596"/>
+            <a:chOff x="5885506" y="2220503"/>
+            <a:chExt cx="1638264" cy="1372596"/>
+          </a:xfrm>
+        </p:grpSpPr>
+        <p:grpSp>
+          <p:nvGrpSpPr>
+            <p:cNvPr id="36" name="Group 35"/>
+            <p:cNvGrpSpPr/>
+            <p:nvPr/>
+          </p:nvGrpSpPr>
+          <p:grpSpPr>
+            <a:xfrm>
+              <a:off x="6106145" y="2220503"/>
+              <a:ext cx="995756" cy="995164"/>
+              <a:chOff x="5153699" y="2206073"/>
+              <a:chExt cx="995756" cy="995164"/>
+            </a:xfrm>
+          </p:grpSpPr>
+          <p:sp>
+            <p:nvSpPr>
+              <p:cNvPr id="8" name="Round Same Side Corner Rectangle 7"/>
+              <p:cNvSpPr/>
+              <p:nvPr/>
+            </p:nvSpPr>
+            <p:spPr>
+              <a:xfrm rot="10800000">
+                <a:off x="5153699" y="2525301"/>
+                <a:ext cx="995756" cy="346327"/>
+              </a:xfrm>
+              <a:prstGeom prst="round2SameRect">
+                <a:avLst>
+                  <a:gd name="adj1" fmla="val 50000"/>
+                  <a:gd name="adj2" fmla="val 0"/>
+                </a:avLst>
+              </a:prstGeom>
+              <a:scene3d>
+                <a:camera prst="orthographicFront"/>
+                <a:lightRig rig="threePt" dir="t"/>
+              </a:scene3d>
+              <a:sp3d>
+                <a:bevelT w="139700" prst="cross"/>
+              </a:sp3d>
+            </p:spPr>
+            <p:style>
+              <a:lnRef idx="2">
+                <a:schemeClr val="dk1"/>
+              </a:lnRef>
+              <a:fillRef idx="1">
+                <a:schemeClr val="lt1"/>
+              </a:fillRef>
+              <a:effectRef idx="0">
+                <a:schemeClr val="dk1"/>
+              </a:effectRef>
+              <a:fontRef idx="minor">
+                <a:schemeClr val="dk1"/>
+              </a:fontRef>
+            </p:style>
+            <p:txBody>
+              <a:bodyPr rtlCol="0" anchor="ctr"/>
+              <a:lstStyle/>
+              <a:p>
+                <a:pPr algn="ctr"/>
+                <a:endParaRPr lang="en-US"/>
+              </a:p>
+            </p:txBody>
+          </p:sp>
+          <p:grpSp>
+            <p:nvGrpSpPr>
+              <p:cNvPr id="14" name="Group 13"/>
+              <p:cNvGrpSpPr/>
+              <p:nvPr/>
+            </p:nvGrpSpPr>
+            <p:grpSpPr>
+              <a:xfrm>
+                <a:off x="5153699" y="2206073"/>
+                <a:ext cx="995756" cy="319228"/>
+                <a:chOff x="5153699" y="2206073"/>
+                <a:chExt cx="995756" cy="319228"/>
+              </a:xfrm>
+            </p:grpSpPr>
+            <p:sp>
+              <p:nvSpPr>
+                <p:cNvPr id="9" name="Round Same Side Corner Rectangle 8"/>
+                <p:cNvSpPr/>
+                <p:nvPr/>
+              </p:nvSpPr>
+              <p:spPr>
+                <a:xfrm>
+                  <a:off x="5153699" y="2372902"/>
+                  <a:ext cx="995756" cy="152399"/>
+                </a:xfrm>
+                <a:prstGeom prst="round2SameRect">
+                  <a:avLst>
+                    <a:gd name="adj1" fmla="val 50000"/>
+                    <a:gd name="adj2" fmla="val 0"/>
+                  </a:avLst>
+                </a:prstGeom>
+              </p:spPr>
+              <p:style>
+                <a:lnRef idx="2">
+                  <a:schemeClr val="dk1"/>
+                </a:lnRef>
+                <a:fillRef idx="1">
+                  <a:schemeClr val="lt1"/>
+                </a:fillRef>
+                <a:effectRef idx="0">
+                  <a:schemeClr val="dk1"/>
+                </a:effectRef>
+                <a:fontRef idx="minor">
+                  <a:schemeClr val="dk1"/>
+                </a:fontRef>
+              </p:style>
+              <p:txBody>
+                <a:bodyPr rtlCol="0" anchor="ctr"/>
+                <a:lstStyle/>
+                <a:p>
+                  <a:pPr algn="ctr"/>
+                  <a:endParaRPr lang="en-US"/>
+                </a:p>
+              </p:txBody>
+            </p:sp>
+            <p:sp>
+              <p:nvSpPr>
+                <p:cNvPr id="10" name="Round Same Side Corner Rectangle 9"/>
+                <p:cNvSpPr/>
+                <p:nvPr/>
+              </p:nvSpPr>
+              <p:spPr>
+                <a:xfrm>
+                  <a:off x="5527169" y="2206073"/>
+                  <a:ext cx="235501" cy="152399"/>
+                </a:xfrm>
+                <a:prstGeom prst="round2SameRect">
+                  <a:avLst>
+                    <a:gd name="adj1" fmla="val 50000"/>
+                    <a:gd name="adj2" fmla="val 0"/>
+                  </a:avLst>
+                </a:prstGeom>
+              </p:spPr>
+              <p:style>
+                <a:lnRef idx="2">
+                  <a:schemeClr val="dk1"/>
+                </a:lnRef>
+                <a:fillRef idx="1">
+                  <a:schemeClr val="lt1"/>
+                </a:fillRef>
+                <a:effectRef idx="0">
+                  <a:schemeClr val="dk1"/>
+                </a:effectRef>
+                <a:fontRef idx="minor">
+                  <a:schemeClr val="dk1"/>
+                </a:fontRef>
+              </p:style>
+              <p:txBody>
+                <a:bodyPr rtlCol="0" anchor="ctr"/>
+                <a:lstStyle/>
+                <a:p>
+                  <a:pPr algn="ctr"/>
+                  <a:endParaRPr lang="en-US"/>
+                </a:p>
+              </p:txBody>
+            </p:sp>
+          </p:grpSp>
+          <p:sp>
+            <p:nvSpPr>
+              <p:cNvPr id="12" name="Teardrop 11"/>
+              <p:cNvSpPr/>
+              <p:nvPr/>
+            </p:nvSpPr>
+            <p:spPr>
+              <a:xfrm rot="2324081" flipH="1">
+                <a:off x="5679815" y="2888991"/>
+                <a:ext cx="92040" cy="214075"/>
+              </a:xfrm>
+              <a:prstGeom prst="teardrop">
+                <a:avLst>
+                  <a:gd name="adj" fmla="val 120000"/>
+                </a:avLst>
+              </a:prstGeom>
+            </p:spPr>
+            <p:style>
+              <a:lnRef idx="1">
+                <a:schemeClr val="accent2"/>
+              </a:lnRef>
+              <a:fillRef idx="3">
+                <a:schemeClr val="accent2"/>
+              </a:fillRef>
+              <a:effectRef idx="2">
+                <a:schemeClr val="accent2"/>
+              </a:effectRef>
+              <a:fontRef idx="minor">
+                <a:schemeClr val="lt1"/>
+              </a:fontRef>
+            </p:style>
+            <p:txBody>
+              <a:bodyPr rtlCol="0" anchor="ctr"/>
+              <a:lstStyle/>
+              <a:p>
+                <a:pPr algn="ctr"/>
+                <a:endParaRPr lang="en-US"/>
+              </a:p>
+            </p:txBody>
+          </p:sp>
+          <p:sp>
+            <p:nvSpPr>
+              <p:cNvPr id="13" name="Teardrop 12"/>
+              <p:cNvSpPr/>
+              <p:nvPr/>
+            </p:nvSpPr>
+            <p:spPr>
+              <a:xfrm rot="18082426">
+                <a:off x="5470524" y="2893164"/>
+                <a:ext cx="168151" cy="215885"/>
+              </a:xfrm>
+              <a:prstGeom prst="teardrop">
+                <a:avLst>
+                  <a:gd name="adj" fmla="val 120000"/>
+                </a:avLst>
+              </a:prstGeom>
+            </p:spPr>
+            <p:style>
+              <a:lnRef idx="1">
+                <a:schemeClr val="accent2"/>
+              </a:lnRef>
+              <a:fillRef idx="3">
+                <a:schemeClr val="accent2"/>
+              </a:fillRef>
+              <a:effectRef idx="2">
+                <a:schemeClr val="accent2"/>
+              </a:effectRef>
+              <a:fontRef idx="minor">
+                <a:schemeClr val="lt1"/>
+              </a:fontRef>
+            </p:style>
+            <p:txBody>
+              <a:bodyPr rtlCol="0" anchor="ctr"/>
+              <a:lstStyle/>
+              <a:p>
+                <a:pPr algn="ctr"/>
+                <a:endParaRPr lang="en-US"/>
+              </a:p>
+            </p:txBody>
+          </p:sp>
+          <p:sp>
+            <p:nvSpPr>
+              <p:cNvPr id="11" name="Round Same Side Corner Rectangle 10"/>
+              <p:cNvSpPr/>
+              <p:nvPr/>
+            </p:nvSpPr>
+            <p:spPr>
+              <a:xfrm>
+                <a:off x="5368427" y="3048838"/>
+                <a:ext cx="578365" cy="152399"/>
+              </a:xfrm>
+              <a:prstGeom prst="round2SameRect">
+                <a:avLst>
+                  <a:gd name="adj1" fmla="val 50000"/>
+                  <a:gd name="adj2" fmla="val 0"/>
+                </a:avLst>
+              </a:prstGeom>
+              <a:solidFill>
+                <a:srgbClr val="FFFFFF"/>
+              </a:solidFill>
+            </p:spPr>
+            <p:style>
+              <a:lnRef idx="2">
+                <a:schemeClr val="dk1"/>
+              </a:lnRef>
+              <a:fillRef idx="1">
+                <a:schemeClr val="lt1"/>
+              </a:fillRef>
+              <a:effectRef idx="0">
+                <a:schemeClr val="dk1"/>
+              </a:effectRef>
+              <a:fontRef idx="minor">
+                <a:schemeClr val="dk1"/>
+              </a:fontRef>
+            </p:style>
+            <p:txBody>
+              <a:bodyPr rtlCol="0" anchor="ctr"/>
+              <a:lstStyle/>
+              <a:p>
+                <a:pPr algn="ctr"/>
+                <a:endParaRPr lang="en-US"/>
+              </a:p>
+            </p:txBody>
+          </p:sp>
+        </p:grpSp>
+        <p:sp>
+          <p:nvSpPr>
+            <p:cNvPr id="58" name="TextBox 57"/>
+            <p:cNvSpPr txBox="1"/>
+            <p:nvPr/>
+          </p:nvSpPr>
+          <p:spPr>
+            <a:xfrm>
+              <a:off x="5885506" y="3223767"/>
+              <a:ext cx="1638264" cy="369332"/>
+            </a:xfrm>
+            <a:prstGeom prst="rect">
+              <a:avLst/>
+            </a:prstGeom>
+            <a:noFill/>
+          </p:spPr>
+          <p:txBody>
+            <a:bodyPr wrap="none" rtlCol="0">
+              <a:spAutoFit/>
+            </a:bodyPr>
+            <a:lstStyle/>
+            <a:p>
+              <a:r>
+                <a:rPr lang="en-US" b="1" dirty="0" err="1" smtClean="0">
+                  <a:latin typeface="Times"/>
+                  <a:cs typeface="Times"/>
+                </a:rPr>
+                <a:t>Equilibrate</a:t>
+              </a:r>
+              <a:r>
+                <a:rPr lang="en-US" b="1" baseline="-25000" dirty="0" err="1" smtClean="0">
+                  <a:latin typeface="Times"/>
+                  <a:cs typeface="Times"/>
+                </a:rPr>
+                <a:t>NVT</a:t>
+              </a:r>
+              <a:endParaRPr lang="en-US" b="1" dirty="0">
+                <a:latin typeface="Times"/>
+                <a:cs typeface="Times"/>
+              </a:endParaRPr>
+            </a:p>
+          </p:txBody>
+        </p:sp>
+      </p:grpSp>
+      <p:grpSp>
+        <p:nvGrpSpPr>
+          <p:cNvPr id="64" name="Group 63"/>
+          <p:cNvGrpSpPr/>
+          <p:nvPr/>
+        </p:nvGrpSpPr>
+        <p:grpSpPr>
+          <a:xfrm>
+            <a:off x="7489565" y="1978720"/>
+            <a:ext cx="1621132" cy="1607998"/>
+            <a:chOff x="7489565" y="1978720"/>
+            <a:chExt cx="1621132" cy="1607998"/>
+          </a:xfrm>
+        </p:grpSpPr>
+        <p:grpSp>
+          <p:nvGrpSpPr>
+            <p:cNvPr id="38" name="Group 37"/>
+            <p:cNvGrpSpPr/>
+            <p:nvPr/>
+          </p:nvGrpSpPr>
+          <p:grpSpPr>
+            <a:xfrm>
+              <a:off x="7609592" y="1978720"/>
+              <a:ext cx="1405291" cy="1230617"/>
+              <a:chOff x="7393127" y="1964290"/>
+              <a:chExt cx="1405291" cy="1230617"/>
+            </a:xfrm>
+          </p:grpSpPr>
+          <p:sp>
+            <p:nvSpPr>
+              <p:cNvPr id="15" name="Round Same Side Corner Rectangle 14"/>
+              <p:cNvSpPr/>
+              <p:nvPr/>
+            </p:nvSpPr>
+            <p:spPr>
+              <a:xfrm rot="10800000">
+                <a:off x="7441887" y="2518971"/>
+                <a:ext cx="995756" cy="346327"/>
+              </a:xfrm>
+              <a:prstGeom prst="round2SameRect">
+                <a:avLst>
+                  <a:gd name="adj1" fmla="val 50000"/>
+                  <a:gd name="adj2" fmla="val 0"/>
+                </a:avLst>
+              </a:prstGeom>
+              <a:scene3d>
+                <a:camera prst="orthographicFront"/>
+                <a:lightRig rig="threePt" dir="t"/>
+              </a:scene3d>
+              <a:sp3d>
+                <a:bevelT w="139700" prst="cross"/>
+              </a:sp3d>
+            </p:spPr>
+            <p:style>
+              <a:lnRef idx="2">
+                <a:schemeClr val="dk1"/>
+              </a:lnRef>
+              <a:fillRef idx="1">
+                <a:schemeClr val="lt1"/>
+              </a:fillRef>
+              <a:effectRef idx="0">
+                <a:schemeClr val="dk1"/>
+              </a:effectRef>
+              <a:fontRef idx="minor">
+                <a:schemeClr val="dk1"/>
+              </a:fontRef>
+            </p:style>
+            <p:txBody>
+              <a:bodyPr rtlCol="0" anchor="ctr"/>
+              <a:lstStyle/>
+              <a:p>
+                <a:pPr algn="ctr"/>
+                <a:endParaRPr lang="en-US"/>
+              </a:p>
+            </p:txBody>
+          </p:sp>
+          <p:grpSp>
+            <p:nvGrpSpPr>
+              <p:cNvPr id="16" name="Group 15"/>
+              <p:cNvGrpSpPr/>
+              <p:nvPr/>
+            </p:nvGrpSpPr>
+            <p:grpSpPr>
+              <a:xfrm rot="2025781">
+                <a:off x="7802662" y="2041013"/>
+                <a:ext cx="995756" cy="319228"/>
+                <a:chOff x="5153699" y="2206073"/>
+                <a:chExt cx="995756" cy="319228"/>
+              </a:xfrm>
+            </p:grpSpPr>
+            <p:sp>
+              <p:nvSpPr>
+                <p:cNvPr id="17" name="Round Same Side Corner Rectangle 16"/>
+                <p:cNvSpPr/>
+                <p:nvPr/>
+              </p:nvSpPr>
+              <p:spPr>
+                <a:xfrm>
+                  <a:off x="5153699" y="2372902"/>
+                  <a:ext cx="995756" cy="152399"/>
+                </a:xfrm>
+                <a:prstGeom prst="round2SameRect">
+                  <a:avLst>
+                    <a:gd name="adj1" fmla="val 50000"/>
+                    <a:gd name="adj2" fmla="val 0"/>
+                  </a:avLst>
+                </a:prstGeom>
+              </p:spPr>
+              <p:style>
+                <a:lnRef idx="2">
+                  <a:schemeClr val="dk1"/>
+                </a:lnRef>
+                <a:fillRef idx="1">
+                  <a:schemeClr val="lt1"/>
+                </a:fillRef>
+                <a:effectRef idx="0">
+                  <a:schemeClr val="dk1"/>
+                </a:effectRef>
+                <a:fontRef idx="minor">
+                  <a:schemeClr val="dk1"/>
+                </a:fontRef>
+              </p:style>
+              <p:txBody>
+                <a:bodyPr rtlCol="0" anchor="ctr"/>
+                <a:lstStyle/>
+                <a:p>
+                  <a:pPr algn="ctr"/>
+                  <a:endParaRPr lang="en-US"/>
+                </a:p>
+              </p:txBody>
+            </p:sp>
+            <p:sp>
+              <p:nvSpPr>
+                <p:cNvPr id="18" name="Round Same Side Corner Rectangle 17"/>
+                <p:cNvSpPr/>
+                <p:nvPr/>
+              </p:nvSpPr>
+              <p:spPr>
+                <a:xfrm>
+                  <a:off x="5527169" y="2206073"/>
+                  <a:ext cx="235501" cy="152399"/>
+                </a:xfrm>
+                <a:prstGeom prst="round2SameRect">
+                  <a:avLst>
+                    <a:gd name="adj1" fmla="val 50000"/>
+                    <a:gd name="adj2" fmla="val 0"/>
+                  </a:avLst>
+                </a:prstGeom>
+              </p:spPr>
+              <p:style>
+                <a:lnRef idx="2">
+                  <a:schemeClr val="dk1"/>
+                </a:lnRef>
+                <a:fillRef idx="1">
+                  <a:schemeClr val="lt1"/>
+                </a:fillRef>
+                <a:effectRef idx="0">
+                  <a:schemeClr val="dk1"/>
+                </a:effectRef>
+                <a:fontRef idx="minor">
+                  <a:schemeClr val="dk1"/>
+                </a:fontRef>
+              </p:style>
+              <p:txBody>
+                <a:bodyPr rtlCol="0" anchor="ctr"/>
+                <a:lstStyle/>
+                <a:p>
+                  <a:pPr algn="ctr"/>
+                  <a:endParaRPr lang="en-US"/>
+                </a:p>
+              </p:txBody>
+            </p:sp>
+          </p:grpSp>
+          <p:sp>
+            <p:nvSpPr>
+              <p:cNvPr id="19" name="Teardrop 18"/>
+              <p:cNvSpPr/>
+              <p:nvPr/>
+            </p:nvSpPr>
+            <p:spPr>
+              <a:xfrm rot="2324081" flipH="1">
+                <a:off x="7968003" y="2882661"/>
+                <a:ext cx="92040" cy="214075"/>
+              </a:xfrm>
+              <a:prstGeom prst="teardrop">
+                <a:avLst>
+                  <a:gd name="adj" fmla="val 120000"/>
+                </a:avLst>
+              </a:prstGeom>
+            </p:spPr>
+            <p:style>
+              <a:lnRef idx="1">
+                <a:schemeClr val="accent2"/>
+              </a:lnRef>
+              <a:fillRef idx="3">
+                <a:schemeClr val="accent2"/>
+              </a:fillRef>
+              <a:effectRef idx="2">
+                <a:schemeClr val="accent2"/>
+              </a:effectRef>
+              <a:fontRef idx="minor">
+                <a:schemeClr val="lt1"/>
+              </a:fontRef>
+            </p:style>
+            <p:txBody>
+              <a:bodyPr rtlCol="0" anchor="ctr"/>
+              <a:lstStyle/>
+              <a:p>
+                <a:pPr algn="ctr"/>
+                <a:endParaRPr lang="en-US"/>
+              </a:p>
+            </p:txBody>
+          </p:sp>
+          <p:sp>
+            <p:nvSpPr>
+              <p:cNvPr id="20" name="Teardrop 19"/>
+              <p:cNvSpPr/>
+              <p:nvPr/>
+            </p:nvSpPr>
+            <p:spPr>
+              <a:xfrm rot="18082426">
+                <a:off x="7758712" y="2886834"/>
+                <a:ext cx="168151" cy="215885"/>
+              </a:xfrm>
+              <a:prstGeom prst="teardrop">
+                <a:avLst>
+                  <a:gd name="adj" fmla="val 120000"/>
+                </a:avLst>
+              </a:prstGeom>
+            </p:spPr>
+            <p:style>
+              <a:lnRef idx="1">
+                <a:schemeClr val="accent2"/>
+              </a:lnRef>
+              <a:fillRef idx="3">
+                <a:schemeClr val="accent2"/>
+              </a:fillRef>
+              <a:effectRef idx="2">
+                <a:schemeClr val="accent2"/>
+              </a:effectRef>
+              <a:fontRef idx="minor">
+                <a:schemeClr val="lt1"/>
+              </a:fontRef>
+            </p:style>
+            <p:txBody>
+              <a:bodyPr rtlCol="0" anchor="ctr"/>
+              <a:lstStyle/>
+              <a:p>
+                <a:pPr algn="ctr"/>
+                <a:endParaRPr lang="en-US"/>
+              </a:p>
+            </p:txBody>
+          </p:sp>
+          <p:sp>
+            <p:nvSpPr>
+              <p:cNvPr id="21" name="Round Same Side Corner Rectangle 20"/>
+              <p:cNvSpPr/>
+              <p:nvPr/>
+            </p:nvSpPr>
+            <p:spPr>
+              <a:xfrm>
+                <a:off x="7656615" y="3042508"/>
+                <a:ext cx="578365" cy="152399"/>
+              </a:xfrm>
+              <a:prstGeom prst="round2SameRect">
+                <a:avLst>
+                  <a:gd name="adj1" fmla="val 50000"/>
+                  <a:gd name="adj2" fmla="val 0"/>
+                </a:avLst>
+              </a:prstGeom>
+              <a:solidFill>
+                <a:srgbClr val="FFFFFF"/>
+              </a:solidFill>
+            </p:spPr>
+            <p:style>
+              <a:lnRef idx="2">
+                <a:schemeClr val="dk1"/>
+              </a:lnRef>
+              <a:fillRef idx="1">
+                <a:schemeClr val="lt1"/>
+              </a:fillRef>
+              <a:effectRef idx="0">
+                <a:schemeClr val="dk1"/>
+              </a:effectRef>
+              <a:fontRef idx="minor">
+                <a:schemeClr val="dk1"/>
+              </a:fontRef>
+            </p:style>
+            <p:txBody>
+              <a:bodyPr rtlCol="0" anchor="ctr"/>
+              <a:lstStyle/>
+              <a:p>
+                <a:pPr algn="ctr"/>
+                <a:endParaRPr lang="en-US"/>
+              </a:p>
+            </p:txBody>
+          </p:sp>
+          <p:cxnSp>
+            <p:nvCxnSpPr>
+              <p:cNvPr id="23" name="Curved Connector 22"/>
+              <p:cNvCxnSpPr/>
+              <p:nvPr/>
+            </p:nvCxnSpPr>
+            <p:spPr>
+              <a:xfrm rot="16200000" flipH="1">
+                <a:off x="7389654" y="2124743"/>
+                <a:ext cx="533921" cy="254535"/>
+              </a:xfrm>
+              <a:prstGeom prst="curvedConnector3">
+                <a:avLst/>
+              </a:prstGeom>
+              <a:ln>
+                <a:solidFill>
+                  <a:schemeClr val="tx1">
+                    <a:lumMod val="50000"/>
+                    <a:lumOff val="50000"/>
+                  </a:schemeClr>
+                </a:solidFill>
+              </a:ln>
+            </p:spPr>
+            <p:style>
+              <a:lnRef idx="2">
+                <a:schemeClr val="dk1"/>
+              </a:lnRef>
+              <a:fillRef idx="0">
+                <a:schemeClr val="dk1"/>
+              </a:fillRef>
+              <a:effectRef idx="1">
+                <a:schemeClr val="dk1"/>
+              </a:effectRef>
+              <a:fontRef idx="minor">
+                <a:schemeClr val="tx1"/>
+              </a:fontRef>
+            </p:style>
+          </p:cxnSp>
+          <p:cxnSp>
+            <p:nvCxnSpPr>
+              <p:cNvPr id="24" name="Curved Connector 23"/>
+              <p:cNvCxnSpPr/>
+              <p:nvPr/>
+            </p:nvCxnSpPr>
+            <p:spPr>
+              <a:xfrm rot="16200000" flipH="1">
+                <a:off x="7542054" y="2103983"/>
+                <a:ext cx="533921" cy="254535"/>
+              </a:xfrm>
+              <a:prstGeom prst="curvedConnector3">
+                <a:avLst/>
+              </a:prstGeom>
+              <a:ln>
+                <a:solidFill>
+                  <a:schemeClr val="tx1">
+                    <a:lumMod val="50000"/>
+                    <a:lumOff val="50000"/>
+                  </a:schemeClr>
+                </a:solidFill>
+              </a:ln>
+            </p:spPr>
+            <p:style>
+              <a:lnRef idx="2">
+                <a:schemeClr val="dk1"/>
+              </a:lnRef>
+              <a:fillRef idx="0">
+                <a:schemeClr val="dk1"/>
+              </a:fillRef>
+              <a:effectRef idx="1">
+                <a:schemeClr val="dk1"/>
+              </a:effectRef>
+              <a:fontRef idx="minor">
+                <a:schemeClr val="tx1"/>
+              </a:fontRef>
+            </p:style>
+          </p:cxnSp>
+          <p:cxnSp>
+            <p:nvCxnSpPr>
+              <p:cNvPr id="25" name="Curved Connector 24"/>
+              <p:cNvCxnSpPr/>
+              <p:nvPr/>
+            </p:nvCxnSpPr>
+            <p:spPr>
+              <a:xfrm rot="16200000" flipH="1">
+                <a:off x="7253434" y="2132843"/>
+                <a:ext cx="533921" cy="254535"/>
+              </a:xfrm>
+              <a:prstGeom prst="curvedConnector3">
+                <a:avLst/>
+              </a:prstGeom>
+              <a:ln>
+                <a:solidFill>
+                  <a:schemeClr val="tx1">
+                    <a:lumMod val="50000"/>
+                    <a:lumOff val="50000"/>
+                  </a:schemeClr>
+                </a:solidFill>
+              </a:ln>
+            </p:spPr>
+            <p:style>
+              <a:lnRef idx="2">
+                <a:schemeClr val="dk1"/>
+              </a:lnRef>
+              <a:fillRef idx="0">
+                <a:schemeClr val="dk1"/>
+              </a:fillRef>
+              <a:effectRef idx="1">
+                <a:schemeClr val="dk1"/>
+              </a:effectRef>
+              <a:fontRef idx="minor">
+                <a:schemeClr val="tx1"/>
+              </a:fontRef>
+            </p:style>
+          </p:cxnSp>
+        </p:grpSp>
+        <p:sp>
+          <p:nvSpPr>
+            <p:cNvPr id="59" name="TextBox 58"/>
+            <p:cNvSpPr txBox="1"/>
+            <p:nvPr/>
+          </p:nvSpPr>
+          <p:spPr>
+            <a:xfrm>
+              <a:off x="7489565" y="3217386"/>
+              <a:ext cx="1621132" cy="369332"/>
+            </a:xfrm>
+            <a:prstGeom prst="rect">
+              <a:avLst/>
+            </a:prstGeom>
+            <a:noFill/>
+          </p:spPr>
+          <p:txBody>
+            <a:bodyPr wrap="none" rtlCol="0">
+              <a:spAutoFit/>
+            </a:bodyPr>
+            <a:lstStyle/>
+            <a:p>
+              <a:r>
+                <a:rPr lang="en-US" b="1" dirty="0" err="1" smtClean="0">
+                  <a:latin typeface="Times"/>
+                  <a:cs typeface="Times"/>
+                </a:rPr>
+                <a:t>Equilibrate</a:t>
+              </a:r>
+              <a:r>
+                <a:rPr lang="en-US" b="1" baseline="-25000" dirty="0" err="1" smtClean="0">
+                  <a:latin typeface="Times"/>
+                  <a:cs typeface="Times"/>
+                </a:rPr>
+                <a:t>NPT</a:t>
+              </a:r>
+              <a:endParaRPr lang="en-US" b="1" dirty="0">
+                <a:latin typeface="Times"/>
+                <a:cs typeface="Times"/>
+              </a:endParaRPr>
+            </a:p>
+          </p:txBody>
+        </p:sp>
+      </p:grpSp>
+    </p:spTree>
+    <p:extLst>
+      <p:ext uri="{BB962C8B-B14F-4D97-AF65-F5344CB8AC3E}">
+        <p14:creationId xmlns:p14="http://schemas.microsoft.com/office/powerpoint/2010/main" val="4102684617"/>
       </p:ext>
     </p:extLst>
   </p:cSld>

</xml_diff>